<commit_message>
Add [for/while/if else/def()] parts in PPT
</commit_message>
<xml_diff>
--- a/TA_Class_I.pptx
+++ b/TA_Class_I.pptx
@@ -17,22 +17,24 @@
     <p:sldId id="295" r:id="rId11"/>
     <p:sldId id="296" r:id="rId12"/>
     <p:sldId id="297" r:id="rId13"/>
-    <p:sldId id="294" r:id="rId14"/>
-    <p:sldId id="298" r:id="rId15"/>
-    <p:sldId id="299" r:id="rId16"/>
-    <p:sldId id="300" r:id="rId17"/>
-    <p:sldId id="280" r:id="rId18"/>
-    <p:sldId id="279" r:id="rId19"/>
-    <p:sldId id="278" r:id="rId20"/>
-    <p:sldId id="301" r:id="rId21"/>
-    <p:sldId id="302" r:id="rId22"/>
-    <p:sldId id="303" r:id="rId23"/>
-    <p:sldId id="304" r:id="rId24"/>
-    <p:sldId id="305" r:id="rId25"/>
-    <p:sldId id="306" r:id="rId26"/>
-    <p:sldId id="307" r:id="rId27"/>
-    <p:sldId id="308" r:id="rId28"/>
-    <p:sldId id="266" r:id="rId29"/>
+    <p:sldId id="309" r:id="rId14"/>
+    <p:sldId id="310" r:id="rId15"/>
+    <p:sldId id="294" r:id="rId16"/>
+    <p:sldId id="298" r:id="rId17"/>
+    <p:sldId id="299" r:id="rId18"/>
+    <p:sldId id="300" r:id="rId19"/>
+    <p:sldId id="280" r:id="rId20"/>
+    <p:sldId id="279" r:id="rId21"/>
+    <p:sldId id="278" r:id="rId22"/>
+    <p:sldId id="301" r:id="rId23"/>
+    <p:sldId id="302" r:id="rId24"/>
+    <p:sldId id="303" r:id="rId25"/>
+    <p:sldId id="304" r:id="rId26"/>
+    <p:sldId id="305" r:id="rId27"/>
+    <p:sldId id="306" r:id="rId28"/>
+    <p:sldId id="307" r:id="rId29"/>
+    <p:sldId id="308" r:id="rId30"/>
+    <p:sldId id="266" r:id="rId31"/>
   </p:sldIdLst>
   <p:sldSz cx="9144000" cy="6858000" type="screen4x3"/>
   <p:notesSz cx="6858000" cy="9144000"/>
@@ -131,6 +133,11 @@
       </a:defRPr>
     </a:lvl9pPr>
   </p:defaultTextStyle>
+  <p:extLst>
+    <p:ext uri="{EFAFB233-063F-42B5-8137-9DF3F51BA10A}">
+      <p15:sldGuideLst xmlns:p15="http://schemas.microsoft.com/office/powerpoint/2012/main"/>
+    </p:ext>
+  </p:extLst>
 </p:presentation>
 </file>
 
@@ -3847,10 +3854,10 @@
       </p:pic>
       <p:sp>
         <p:nvSpPr>
-          <p:cNvPr id="9" name="矩形 8">
-            <a:extLst>
-              <a:ext uri="{FF2B5EF4-FFF2-40B4-BE49-F238E27FC236}">
-                <a16:creationId xmlns:a16="http://schemas.microsoft.com/office/drawing/2014/main" id="{92C15B3E-BBBE-4D6B-86D5-1CB517E65301}"/>
+          <p:cNvPr id="5" name="矩形 4">
+            <a:extLst>
+              <a:ext uri="{FF2B5EF4-FFF2-40B4-BE49-F238E27FC236}">
+                <a16:creationId xmlns:a16="http://schemas.microsoft.com/office/drawing/2014/main" id="{39A7062D-9012-4217-B254-93B09C8B4167}"/>
               </a:ext>
             </a:extLst>
           </p:cNvPr>
@@ -3860,7 +3867,7 @@
         <p:spPr>
           <a:xfrm>
             <a:off x="729809" y="608473"/>
-            <a:ext cx="3474028" cy="578492"/>
+            <a:ext cx="3698448" cy="578492"/>
           </a:xfrm>
           <a:prstGeom prst="rect">
             <a:avLst/>
@@ -3882,17 +3889,17 @@
                 <a:latin typeface="微軟正黑體" panose="020B0604030504040204" pitchFamily="34" charset="-120"/>
                 <a:ea typeface="微軟正黑體" panose="020B0604030504040204" pitchFamily="34" charset="-120"/>
               </a:rPr>
-              <a:t>mutable vs. immutable</a:t>
+              <a:t>for / while / if else / def()</a:t>
             </a:r>
           </a:p>
         </p:txBody>
       </p:sp>
       <p:pic>
         <p:nvPicPr>
-          <p:cNvPr id="11" name="圖片 10" descr="一張含有 螢幕擷取畫面 的圖片&#10;&#10;自動產生的描述">
-            <a:extLst>
-              <a:ext uri="{FF2B5EF4-FFF2-40B4-BE49-F238E27FC236}">
-                <a16:creationId xmlns:a16="http://schemas.microsoft.com/office/drawing/2014/main" id="{44FC0BDE-8AF6-46F1-870E-429FA2097ED3}"/>
+          <p:cNvPr id="8" name="圖片 7" descr="一張含有 螢幕擷取畫面 的圖片&#10;&#10;自動產生的描述">
+            <a:extLst>
+              <a:ext uri="{FF2B5EF4-FFF2-40B4-BE49-F238E27FC236}">
+                <a16:creationId xmlns:a16="http://schemas.microsoft.com/office/drawing/2014/main" id="{A0E70E2A-61C2-4948-8997-91B51C7F559E}"/>
               </a:ext>
             </a:extLst>
           </p:cNvPr>
@@ -3916,7 +3923,7 @@
         <p:spPr>
           <a:xfrm>
             <a:off x="729809" y="1647447"/>
-            <a:ext cx="7776154" cy="2401384"/>
+            <a:ext cx="7776155" cy="2252616"/>
           </a:xfrm>
           <a:prstGeom prst="rect">
             <a:avLst/>
@@ -3926,7 +3933,7 @@
     </p:spTree>
     <p:extLst>
       <p:ext uri="{BB962C8B-B14F-4D97-AF65-F5344CB8AC3E}">
-        <p14:creationId xmlns:p14="http://schemas.microsoft.com/office/powerpoint/2010/main" val="286176865"/>
+        <p14:creationId xmlns:p14="http://schemas.microsoft.com/office/powerpoint/2010/main" val="3676835552"/>
       </p:ext>
     </p:extLst>
   </p:cSld>
@@ -4025,54 +4032,12 @@
           </a:prstGeom>
         </p:spPr>
       </p:pic>
-      <p:sp>
-        <p:nvSpPr>
-          <p:cNvPr id="9" name="矩形 8">
-            <a:extLst>
-              <a:ext uri="{FF2B5EF4-FFF2-40B4-BE49-F238E27FC236}">
-                <a16:creationId xmlns:a16="http://schemas.microsoft.com/office/drawing/2014/main" id="{92C15B3E-BBBE-4D6B-86D5-1CB517E65301}"/>
-              </a:ext>
-            </a:extLst>
-          </p:cNvPr>
-          <p:cNvSpPr/>
-          <p:nvPr/>
-        </p:nvSpPr>
-        <p:spPr>
-          <a:xfrm>
-            <a:off x="729809" y="608473"/>
-            <a:ext cx="5411546" cy="578492"/>
-          </a:xfrm>
-          <a:prstGeom prst="rect">
-            <a:avLst/>
-          </a:prstGeom>
-        </p:spPr>
-        <p:txBody>
-          <a:bodyPr wrap="none">
-            <a:spAutoFit/>
-          </a:bodyPr>
-          <a:lstStyle/>
-          <a:p>
-            <a:pPr>
-              <a:lnSpc>
-                <a:spcPct val="150000"/>
-              </a:lnSpc>
-            </a:pPr>
-            <a:r>
-              <a:rPr lang="en-US" altLang="zh-TW" sz="2400" dirty="0">
-                <a:latin typeface="微軟正黑體" panose="020B0604030504040204" pitchFamily="34" charset="-120"/>
-                <a:ea typeface="微軟正黑體" panose="020B0604030504040204" pitchFamily="34" charset="-120"/>
-              </a:rPr>
-              <a:t>Address - Binding Names to Objects</a:t>
-            </a:r>
-          </a:p>
-        </p:txBody>
-      </p:sp>
       <p:pic>
         <p:nvPicPr>
-          <p:cNvPr id="8" name="圖片 7" descr="一張含有 螢幕擷取畫面 的圖片&#10;&#10;自動產生的描述">
-            <a:extLst>
-              <a:ext uri="{FF2B5EF4-FFF2-40B4-BE49-F238E27FC236}">
-                <a16:creationId xmlns:a16="http://schemas.microsoft.com/office/drawing/2014/main" id="{C0EE1147-F783-4B9A-9312-2337387466D3}"/>
+          <p:cNvPr id="6" name="圖片 5" descr="一張含有 螢幕擷取畫面 的圖片&#10;&#10;自動產生的描述">
+            <a:extLst>
+              <a:ext uri="{FF2B5EF4-FFF2-40B4-BE49-F238E27FC236}">
+                <a16:creationId xmlns:a16="http://schemas.microsoft.com/office/drawing/2014/main" id="{ED68D364-FF32-426A-9033-B08154839C09}"/>
               </a:ext>
             </a:extLst>
           </p:cNvPr>
@@ -4095,8 +4060,8 @@
         </p:blipFill>
         <p:spPr>
           <a:xfrm>
-            <a:off x="729809" y="1647447"/>
-            <a:ext cx="7776154" cy="2700484"/>
+            <a:off x="683922" y="1647447"/>
+            <a:ext cx="7776155" cy="2604060"/>
           </a:xfrm>
           <a:prstGeom prst="rect">
             <a:avLst/>
@@ -4106,7 +4071,7 @@
     </p:spTree>
     <p:extLst>
       <p:ext uri="{BB962C8B-B14F-4D97-AF65-F5344CB8AC3E}">
-        <p14:creationId xmlns:p14="http://schemas.microsoft.com/office/powerpoint/2010/main" val="1144447257"/>
+        <p14:creationId xmlns:p14="http://schemas.microsoft.com/office/powerpoint/2010/main" val="2180686953"/>
       </p:ext>
     </p:extLst>
   </p:cSld>
@@ -4205,12 +4170,54 @@
           </a:prstGeom>
         </p:spPr>
       </p:pic>
+      <p:sp>
+        <p:nvSpPr>
+          <p:cNvPr id="9" name="矩形 8">
+            <a:extLst>
+              <a:ext uri="{FF2B5EF4-FFF2-40B4-BE49-F238E27FC236}">
+                <a16:creationId xmlns:a16="http://schemas.microsoft.com/office/drawing/2014/main" id="{92C15B3E-BBBE-4D6B-86D5-1CB517E65301}"/>
+              </a:ext>
+            </a:extLst>
+          </p:cNvPr>
+          <p:cNvSpPr/>
+          <p:nvPr/>
+        </p:nvSpPr>
+        <p:spPr>
+          <a:xfrm>
+            <a:off x="729809" y="608473"/>
+            <a:ext cx="3474028" cy="578492"/>
+          </a:xfrm>
+          <a:prstGeom prst="rect">
+            <a:avLst/>
+          </a:prstGeom>
+        </p:spPr>
+        <p:txBody>
+          <a:bodyPr wrap="none">
+            <a:spAutoFit/>
+          </a:bodyPr>
+          <a:lstStyle/>
+          <a:p>
+            <a:pPr>
+              <a:lnSpc>
+                <a:spcPct val="150000"/>
+              </a:lnSpc>
+            </a:pPr>
+            <a:r>
+              <a:rPr lang="en-US" altLang="zh-TW" sz="2400" dirty="0">
+                <a:latin typeface="微軟正黑體" panose="020B0604030504040204" pitchFamily="34" charset="-120"/>
+                <a:ea typeface="微軟正黑體" panose="020B0604030504040204" pitchFamily="34" charset="-120"/>
+              </a:rPr>
+              <a:t>mutable vs. immutable</a:t>
+            </a:r>
+          </a:p>
+        </p:txBody>
+      </p:sp>
       <p:pic>
         <p:nvPicPr>
-          <p:cNvPr id="5" name="圖片 4" descr="一張含有 螢幕擷取畫面 的圖片&#10;&#10;自動產生的描述">
-            <a:extLst>
-              <a:ext uri="{FF2B5EF4-FFF2-40B4-BE49-F238E27FC236}">
-                <a16:creationId xmlns:a16="http://schemas.microsoft.com/office/drawing/2014/main" id="{6C853FD9-339B-4DB6-B986-AC912A3F72A8}"/>
+          <p:cNvPr id="11" name="圖片 10" descr="一張含有 螢幕擷取畫面 的圖片&#10;&#10;自動產生的描述">
+            <a:extLst>
+              <a:ext uri="{FF2B5EF4-FFF2-40B4-BE49-F238E27FC236}">
+                <a16:creationId xmlns:a16="http://schemas.microsoft.com/office/drawing/2014/main" id="{44FC0BDE-8AF6-46F1-870E-429FA2097ED3}"/>
               </a:ext>
             </a:extLst>
           </p:cNvPr>
@@ -4234,7 +4241,7 @@
         <p:spPr>
           <a:xfrm>
             <a:off x="729809" y="1647447"/>
-            <a:ext cx="7776154" cy="2583474"/>
+            <a:ext cx="7776154" cy="2401384"/>
           </a:xfrm>
           <a:prstGeom prst="rect">
             <a:avLst/>
@@ -4244,7 +4251,7 @@
     </p:spTree>
     <p:extLst>
       <p:ext uri="{BB962C8B-B14F-4D97-AF65-F5344CB8AC3E}">
-        <p14:creationId xmlns:p14="http://schemas.microsoft.com/office/powerpoint/2010/main" val="3284996421"/>
+        <p14:creationId xmlns:p14="http://schemas.microsoft.com/office/powerpoint/2010/main" val="286176865"/>
       </p:ext>
     </p:extLst>
   </p:cSld>
@@ -4345,10 +4352,10 @@
       </p:pic>
       <p:sp>
         <p:nvSpPr>
-          <p:cNvPr id="5" name="矩形 4">
-            <a:extLst>
-              <a:ext uri="{FF2B5EF4-FFF2-40B4-BE49-F238E27FC236}">
-                <a16:creationId xmlns:a16="http://schemas.microsoft.com/office/drawing/2014/main" id="{973E8D2D-159F-4A54-A9F3-55342886FD40}"/>
+          <p:cNvPr id="9" name="矩形 8">
+            <a:extLst>
+              <a:ext uri="{FF2B5EF4-FFF2-40B4-BE49-F238E27FC236}">
+                <a16:creationId xmlns:a16="http://schemas.microsoft.com/office/drawing/2014/main" id="{92C15B3E-BBBE-4D6B-86D5-1CB517E65301}"/>
               </a:ext>
             </a:extLst>
           </p:cNvPr>
@@ -4358,7 +4365,7 @@
         <p:spPr>
           <a:xfrm>
             <a:off x="729809" y="608473"/>
-            <a:ext cx="2898550" cy="578492"/>
+            <a:ext cx="5411546" cy="578492"/>
           </a:xfrm>
           <a:prstGeom prst="rect">
             <a:avLst/>
@@ -4380,17 +4387,17 @@
                 <a:latin typeface="微軟正黑體" panose="020B0604030504040204" pitchFamily="34" charset="-120"/>
                 <a:ea typeface="微軟正黑體" panose="020B0604030504040204" pitchFamily="34" charset="-120"/>
               </a:rPr>
-              <a:t>Call by assignment</a:t>
+              <a:t>Address - Binding Names to Objects</a:t>
             </a:r>
           </a:p>
         </p:txBody>
       </p:sp>
       <p:pic>
         <p:nvPicPr>
-          <p:cNvPr id="7" name="圖片 6" descr="一張含有 螢幕擷取畫面 的圖片&#10;&#10;自動產生的描述">
-            <a:extLst>
-              <a:ext uri="{FF2B5EF4-FFF2-40B4-BE49-F238E27FC236}">
-                <a16:creationId xmlns:a16="http://schemas.microsoft.com/office/drawing/2014/main" id="{D4D3C773-0B2E-4F52-AFDE-A313B4222ACC}"/>
+          <p:cNvPr id="8" name="圖片 7" descr="一張含有 螢幕擷取畫面 的圖片&#10;&#10;自動產生的描述">
+            <a:extLst>
+              <a:ext uri="{FF2B5EF4-FFF2-40B4-BE49-F238E27FC236}">
+                <a16:creationId xmlns:a16="http://schemas.microsoft.com/office/drawing/2014/main" id="{C0EE1147-F783-4B9A-9312-2337387466D3}"/>
               </a:ext>
             </a:extLst>
           </p:cNvPr>
@@ -4414,7 +4421,7 @@
         <p:spPr>
           <a:xfrm>
             <a:off x="729809" y="1647447"/>
-            <a:ext cx="7776154" cy="3447479"/>
+            <a:ext cx="7776154" cy="2700484"/>
           </a:xfrm>
           <a:prstGeom prst="rect">
             <a:avLst/>
@@ -4424,7 +4431,7 @@
     </p:spTree>
     <p:extLst>
       <p:ext uri="{BB962C8B-B14F-4D97-AF65-F5344CB8AC3E}">
-        <p14:creationId xmlns:p14="http://schemas.microsoft.com/office/powerpoint/2010/main" val="463498846"/>
+        <p14:creationId xmlns:p14="http://schemas.microsoft.com/office/powerpoint/2010/main" val="1144447257"/>
       </p:ext>
     </p:extLst>
   </p:cSld>
@@ -4523,236 +4530,12 @@
           </a:prstGeom>
         </p:spPr>
       </p:pic>
-      <p:cxnSp>
-        <p:nvCxnSpPr>
-          <p:cNvPr id="5" name="直線接點 4">
-            <a:extLst>
-              <a:ext uri="{FF2B5EF4-FFF2-40B4-BE49-F238E27FC236}">
-                <a16:creationId xmlns:a16="http://schemas.microsoft.com/office/drawing/2014/main" id="{D5F0CB79-799A-4CC2-98F0-75E3818BB5BB}"/>
-              </a:ext>
-            </a:extLst>
-          </p:cNvPr>
-          <p:cNvCxnSpPr>
-            <a:cxnSpLocks/>
-          </p:cNvCxnSpPr>
-          <p:nvPr/>
-        </p:nvCxnSpPr>
-        <p:spPr>
-          <a:xfrm>
-            <a:off x="678535" y="637564"/>
-            <a:ext cx="285226" cy="503339"/>
-          </a:xfrm>
-          <a:prstGeom prst="line">
-            <a:avLst/>
-          </a:prstGeom>
-          <a:ln w="28575">
-            <a:solidFill>
-              <a:schemeClr val="bg1">
-                <a:lumMod val="50000"/>
-              </a:schemeClr>
-            </a:solidFill>
-          </a:ln>
-        </p:spPr>
-        <p:style>
-          <a:lnRef idx="1">
-            <a:schemeClr val="accent1"/>
-          </a:lnRef>
-          <a:fillRef idx="0">
-            <a:schemeClr val="accent1"/>
-          </a:fillRef>
-          <a:effectRef idx="0">
-            <a:schemeClr val="accent1"/>
-          </a:effectRef>
-          <a:fontRef idx="minor">
-            <a:schemeClr val="tx1"/>
-          </a:fontRef>
-        </p:style>
-      </p:cxnSp>
-      <p:cxnSp>
-        <p:nvCxnSpPr>
-          <p:cNvPr id="6" name="直線接點 5">
-            <a:extLst>
-              <a:ext uri="{FF2B5EF4-FFF2-40B4-BE49-F238E27FC236}">
-                <a16:creationId xmlns:a16="http://schemas.microsoft.com/office/drawing/2014/main" id="{922E2757-E96E-4B60-8304-8FB93A805828}"/>
-              </a:ext>
-            </a:extLst>
-          </p:cNvPr>
-          <p:cNvCxnSpPr>
-            <a:cxnSpLocks/>
-          </p:cNvCxnSpPr>
-          <p:nvPr/>
-        </p:nvCxnSpPr>
-        <p:spPr>
-          <a:xfrm>
-            <a:off x="963761" y="1140903"/>
-            <a:ext cx="3162650" cy="0"/>
-          </a:xfrm>
-          <a:prstGeom prst="line">
-            <a:avLst/>
-          </a:prstGeom>
-          <a:ln w="28575">
-            <a:solidFill>
-              <a:schemeClr val="bg1">
-                <a:lumMod val="50000"/>
-              </a:schemeClr>
-            </a:solidFill>
-          </a:ln>
-        </p:spPr>
-        <p:style>
-          <a:lnRef idx="1">
-            <a:schemeClr val="accent1"/>
-          </a:lnRef>
-          <a:fillRef idx="0">
-            <a:schemeClr val="accent1"/>
-          </a:fillRef>
-          <a:effectRef idx="0">
-            <a:schemeClr val="accent1"/>
-          </a:effectRef>
-          <a:fontRef idx="minor">
-            <a:schemeClr val="tx1"/>
-          </a:fontRef>
-        </p:style>
-      </p:cxnSp>
-      <p:cxnSp>
-        <p:nvCxnSpPr>
-          <p:cNvPr id="7" name="直線接點 6">
-            <a:extLst>
-              <a:ext uri="{FF2B5EF4-FFF2-40B4-BE49-F238E27FC236}">
-                <a16:creationId xmlns:a16="http://schemas.microsoft.com/office/drawing/2014/main" id="{742066B1-934E-4E50-8862-0E4B0976815C}"/>
-              </a:ext>
-            </a:extLst>
-          </p:cNvPr>
-          <p:cNvCxnSpPr>
-            <a:cxnSpLocks/>
-          </p:cNvCxnSpPr>
-          <p:nvPr/>
-        </p:nvCxnSpPr>
-        <p:spPr>
-          <a:xfrm>
-            <a:off x="4126411" y="1140904"/>
-            <a:ext cx="285226" cy="503339"/>
-          </a:xfrm>
-          <a:prstGeom prst="line">
-            <a:avLst/>
-          </a:prstGeom>
-          <a:ln w="28575">
-            <a:solidFill>
-              <a:schemeClr val="bg1">
-                <a:lumMod val="50000"/>
-              </a:schemeClr>
-            </a:solidFill>
-          </a:ln>
-        </p:spPr>
-        <p:style>
-          <a:lnRef idx="1">
-            <a:schemeClr val="accent1"/>
-          </a:lnRef>
-          <a:fillRef idx="0">
-            <a:schemeClr val="accent1"/>
-          </a:fillRef>
-          <a:effectRef idx="0">
-            <a:schemeClr val="accent1"/>
-          </a:effectRef>
-          <a:fontRef idx="minor">
-            <a:schemeClr val="tx1"/>
-          </a:fontRef>
-        </p:style>
-      </p:cxnSp>
-      <p:sp>
-        <p:nvSpPr>
-          <p:cNvPr id="8" name="文字方塊 7">
-            <a:extLst>
-              <a:ext uri="{FF2B5EF4-FFF2-40B4-BE49-F238E27FC236}">
-                <a16:creationId xmlns:a16="http://schemas.microsoft.com/office/drawing/2014/main" id="{F37CB849-7B3F-4D20-B9C9-8EADDC6746E2}"/>
-              </a:ext>
-            </a:extLst>
-          </p:cNvPr>
-          <p:cNvSpPr txBox="1"/>
-          <p:nvPr/>
-        </p:nvSpPr>
-        <p:spPr>
-          <a:xfrm>
-            <a:off x="963761" y="433017"/>
-            <a:ext cx="2682145" cy="707886"/>
-          </a:xfrm>
-          <a:prstGeom prst="rect">
-            <a:avLst/>
-          </a:prstGeom>
-          <a:noFill/>
-        </p:spPr>
-        <p:txBody>
-          <a:bodyPr wrap="none" rtlCol="0">
-            <a:spAutoFit/>
-          </a:bodyPr>
-          <a:lstStyle/>
-          <a:p>
-            <a:r>
-              <a:rPr lang="en-US" altLang="zh-TW" sz="4000" dirty="0">
-                <a:latin typeface="微軟正黑體" panose="020B0604030504040204" pitchFamily="34" charset="-120"/>
-                <a:ea typeface="微軟正黑體" panose="020B0604030504040204" pitchFamily="34" charset="-120"/>
-                <a:cs typeface="Times New Roman" panose="02020603050405020304" pitchFamily="18" charset="0"/>
-                <a:hlinkClick r:id="rId4"/>
-              </a:rPr>
-              <a:t>matplotlib</a:t>
-            </a:r>
-            <a:endParaRPr lang="zh-TW" altLang="en-US" sz="4000" dirty="0">
-              <a:latin typeface="微軟正黑體" panose="020B0604030504040204" pitchFamily="34" charset="-120"/>
-              <a:ea typeface="微軟正黑體" panose="020B0604030504040204" pitchFamily="34" charset="-120"/>
-              <a:cs typeface="Times New Roman" panose="02020603050405020304" pitchFamily="18" charset="0"/>
-            </a:endParaRPr>
-          </a:p>
-        </p:txBody>
-      </p:sp>
-      <p:sp>
-        <p:nvSpPr>
-          <p:cNvPr id="10" name="文字方塊 9">
-            <a:extLst>
-              <a:ext uri="{FF2B5EF4-FFF2-40B4-BE49-F238E27FC236}">
-                <a16:creationId xmlns:a16="http://schemas.microsoft.com/office/drawing/2014/main" id="{7E676790-64E8-4754-B12A-E1C16C54D948}"/>
-              </a:ext>
-            </a:extLst>
-          </p:cNvPr>
-          <p:cNvSpPr txBox="1"/>
-          <p:nvPr/>
-        </p:nvSpPr>
-        <p:spPr>
-          <a:xfrm>
-            <a:off x="1378690" y="5517041"/>
-            <a:ext cx="6386620" cy="400110"/>
-          </a:xfrm>
-          <a:prstGeom prst="rect">
-            <a:avLst/>
-          </a:prstGeom>
-          <a:noFill/>
-        </p:spPr>
-        <p:txBody>
-          <a:bodyPr wrap="none" rtlCol="0">
-            <a:spAutoFit/>
-          </a:bodyPr>
-          <a:lstStyle/>
-          <a:p>
-            <a:r>
-              <a:rPr lang="en-US" altLang="zh-TW" sz="2000" u="sng" dirty="0">
-                <a:solidFill>
-                  <a:srgbClr val="FF0000"/>
-                </a:solidFill>
-              </a:rPr>
-              <a:t>Check out what parameters should be put in each functions</a:t>
-            </a:r>
-            <a:endParaRPr lang="zh-TW" altLang="en-US" sz="2000" u="sng" dirty="0">
-              <a:solidFill>
-                <a:srgbClr val="FF0000"/>
-              </a:solidFill>
-            </a:endParaRPr>
-          </a:p>
-        </p:txBody>
-      </p:sp>
       <p:pic>
         <p:nvPicPr>
-          <p:cNvPr id="11" name="圖片 10" descr="一張含有 螢幕擷取畫面 的圖片&#10;&#10;自動產生的描述">
-            <a:extLst>
-              <a:ext uri="{FF2B5EF4-FFF2-40B4-BE49-F238E27FC236}">
-                <a16:creationId xmlns:a16="http://schemas.microsoft.com/office/drawing/2014/main" id="{4722C2FA-BC24-42DE-9581-6D7405E8D176}"/>
+          <p:cNvPr id="5" name="圖片 4" descr="一張含有 螢幕擷取畫面 的圖片&#10;&#10;自動產生的描述">
+            <a:extLst>
+              <a:ext uri="{FF2B5EF4-FFF2-40B4-BE49-F238E27FC236}">
+                <a16:creationId xmlns:a16="http://schemas.microsoft.com/office/drawing/2014/main" id="{6C853FD9-339B-4DB6-B986-AC912A3F72A8}"/>
               </a:ext>
             </a:extLst>
           </p:cNvPr>
@@ -4762,7 +4545,7 @@
           <p:nvPr/>
         </p:nvPicPr>
         <p:blipFill>
-          <a:blip r:embed="rId5">
+          <a:blip r:embed="rId4">
             <a:extLst>
               <a:ext uri="{28A0092B-C50C-407E-A947-70E740481C1C}">
                 <a14:useLocalDpi xmlns:a14="http://schemas.microsoft.com/office/drawing/2010/main" val="0"/>
@@ -4775,44 +4558,8 @@
         </p:blipFill>
         <p:spPr>
           <a:xfrm>
-            <a:off x="1134858" y="1420593"/>
-            <a:ext cx="2389583" cy="3656785"/>
-          </a:xfrm>
-          <a:prstGeom prst="rect">
-            <a:avLst/>
-          </a:prstGeom>
-        </p:spPr>
-      </p:pic>
-      <p:pic>
-        <p:nvPicPr>
-          <p:cNvPr id="12" name="圖片 11" descr="一張含有 螢幕擷取畫面 的圖片&#10;&#10;自動產生的描述">
-            <a:extLst>
-              <a:ext uri="{FF2B5EF4-FFF2-40B4-BE49-F238E27FC236}">
-                <a16:creationId xmlns:a16="http://schemas.microsoft.com/office/drawing/2014/main" id="{1DF7228C-6A44-430A-8726-87E3AAAD40DA}"/>
-              </a:ext>
-            </a:extLst>
-          </p:cNvPr>
-          <p:cNvPicPr>
-            <a:picLocks noChangeAspect="1"/>
-          </p:cNvPicPr>
-          <p:nvPr/>
-        </p:nvPicPr>
-        <p:blipFill>
-          <a:blip r:embed="rId6">
-            <a:extLst>
-              <a:ext uri="{28A0092B-C50C-407E-A947-70E740481C1C}">
-                <a14:useLocalDpi xmlns:a14="http://schemas.microsoft.com/office/drawing/2010/main" val="0"/>
-              </a:ext>
-            </a:extLst>
-          </a:blip>
-          <a:stretch>
-            <a:fillRect/>
-          </a:stretch>
-        </p:blipFill>
-        <p:spPr>
-          <a:xfrm>
-            <a:off x="5039500" y="1420593"/>
-            <a:ext cx="2971215" cy="3765702"/>
+            <a:off x="729809" y="1647447"/>
+            <a:ext cx="7776154" cy="2583474"/>
           </a:xfrm>
           <a:prstGeom prst="rect">
             <a:avLst/>
@@ -4822,7 +4569,7 @@
     </p:spTree>
     <p:extLst>
       <p:ext uri="{BB962C8B-B14F-4D97-AF65-F5344CB8AC3E}">
-        <p14:creationId xmlns:p14="http://schemas.microsoft.com/office/powerpoint/2010/main" val="1612569964"/>
+        <p14:creationId xmlns:p14="http://schemas.microsoft.com/office/powerpoint/2010/main" val="3284996421"/>
       </p:ext>
     </p:extLst>
   </p:cSld>
@@ -4926,7 +4673,7 @@
           <p:cNvPr id="5" name="矩形 4">
             <a:extLst>
               <a:ext uri="{FF2B5EF4-FFF2-40B4-BE49-F238E27FC236}">
-                <a16:creationId xmlns:a16="http://schemas.microsoft.com/office/drawing/2014/main" id="{AA3ECC21-343E-4408-A40F-0382BA633D21}"/>
+                <a16:creationId xmlns:a16="http://schemas.microsoft.com/office/drawing/2014/main" id="{973E8D2D-159F-4A54-A9F3-55342886FD40}"/>
               </a:ext>
             </a:extLst>
           </p:cNvPr>
@@ -4935,8 +4682,8 @@
         </p:nvSpPr>
         <p:spPr>
           <a:xfrm>
-            <a:off x="729809" y="440693"/>
-            <a:ext cx="2456122" cy="578492"/>
+            <a:off x="729809" y="608473"/>
+            <a:ext cx="2898550" cy="578492"/>
           </a:xfrm>
           <a:prstGeom prst="rect">
             <a:avLst/>
@@ -4958,17 +4705,17 @@
                 <a:latin typeface="微軟正黑體" panose="020B0604030504040204" pitchFamily="34" charset="-120"/>
                 <a:ea typeface="微軟正黑體" panose="020B0604030504040204" pitchFamily="34" charset="-120"/>
               </a:rPr>
-              <a:t>Some examples</a:t>
+              <a:t>Call by assignment</a:t>
             </a:r>
           </a:p>
         </p:txBody>
       </p:sp>
       <p:pic>
         <p:nvPicPr>
-          <p:cNvPr id="8" name="圖片 7">
-            <a:extLst>
-              <a:ext uri="{FF2B5EF4-FFF2-40B4-BE49-F238E27FC236}">
-                <a16:creationId xmlns:a16="http://schemas.microsoft.com/office/drawing/2014/main" id="{4200DA8D-0216-46B3-9B7C-F9F2B56DEF71}"/>
+          <p:cNvPr id="7" name="圖片 6" descr="一張含有 螢幕擷取畫面 的圖片&#10;&#10;自動產生的描述">
+            <a:extLst>
+              <a:ext uri="{FF2B5EF4-FFF2-40B4-BE49-F238E27FC236}">
+                <a16:creationId xmlns:a16="http://schemas.microsoft.com/office/drawing/2014/main" id="{D4D3C773-0B2E-4F52-AFDE-A313B4222ACC}"/>
               </a:ext>
             </a:extLst>
           </p:cNvPr>
@@ -4991,96 +4738,18 @@
         </p:blipFill>
         <p:spPr>
           <a:xfrm>
-            <a:off x="729809" y="1378999"/>
-            <a:ext cx="7684382" cy="697655"/>
+            <a:off x="729809" y="1647447"/>
+            <a:ext cx="7776154" cy="3447479"/>
           </a:xfrm>
           <a:prstGeom prst="rect">
             <a:avLst/>
           </a:prstGeom>
         </p:spPr>
       </p:pic>
-      <p:pic>
-        <p:nvPicPr>
-          <p:cNvPr id="10" name="圖片 9" descr="一張含有 螢幕擷取畫面 的圖片&#10;&#10;自動產生的描述">
-            <a:extLst>
-              <a:ext uri="{FF2B5EF4-FFF2-40B4-BE49-F238E27FC236}">
-                <a16:creationId xmlns:a16="http://schemas.microsoft.com/office/drawing/2014/main" id="{73B11239-8DA8-4182-B7AE-9BD67014E139}"/>
-              </a:ext>
-            </a:extLst>
-          </p:cNvPr>
-          <p:cNvPicPr>
-            <a:picLocks noChangeAspect="1"/>
-          </p:cNvPicPr>
-          <p:nvPr/>
-        </p:nvPicPr>
-        <p:blipFill>
-          <a:blip r:embed="rId5">
-            <a:extLst>
-              <a:ext uri="{28A0092B-C50C-407E-A947-70E740481C1C}">
-                <a14:useLocalDpi xmlns:a14="http://schemas.microsoft.com/office/drawing/2010/main" val="0"/>
-              </a:ext>
-            </a:extLst>
-          </a:blip>
-          <a:stretch>
-            <a:fillRect/>
-          </a:stretch>
-        </p:blipFill>
-        <p:spPr>
-          <a:xfrm>
-            <a:off x="729809" y="2677065"/>
-            <a:ext cx="7693451" cy="3231046"/>
-          </a:xfrm>
-          <a:prstGeom prst="rect">
-            <a:avLst/>
-          </a:prstGeom>
-        </p:spPr>
-      </p:pic>
-      <p:sp>
-        <p:nvSpPr>
-          <p:cNvPr id="11" name="矩形 10">
-            <a:extLst>
-              <a:ext uri="{FF2B5EF4-FFF2-40B4-BE49-F238E27FC236}">
-                <a16:creationId xmlns:a16="http://schemas.microsoft.com/office/drawing/2014/main" id="{C07107BD-2114-4B03-927E-012BF1309FD8}"/>
-              </a:ext>
-            </a:extLst>
-          </p:cNvPr>
-          <p:cNvSpPr/>
-          <p:nvPr/>
-        </p:nvSpPr>
-        <p:spPr>
-          <a:xfrm>
-            <a:off x="1178923" y="2168661"/>
-            <a:ext cx="6786153" cy="416396"/>
-          </a:xfrm>
-          <a:prstGeom prst="rect">
-            <a:avLst/>
-          </a:prstGeom>
-        </p:spPr>
-        <p:txBody>
-          <a:bodyPr wrap="none">
-            <a:spAutoFit/>
-          </a:bodyPr>
-          <a:lstStyle/>
-          <a:p>
-            <a:pPr>
-              <a:lnSpc>
-                <a:spcPct val="150000"/>
-              </a:lnSpc>
-            </a:pPr>
-            <a:r>
-              <a:rPr lang="en-US" altLang="zh-TW" sz="1600" b="1" dirty="0">
-                <a:latin typeface="微軟正黑體" panose="020B0604030504040204" pitchFamily="34" charset="-120"/>
-                <a:ea typeface="微軟正黑體" panose="020B0604030504040204" pitchFamily="34" charset="-120"/>
-              </a:rPr>
-              <a:t>You can either plot a list directly or assign some specific X's and Y's.</a:t>
-            </a:r>
-          </a:p>
-        </p:txBody>
-      </p:sp>
     </p:spTree>
     <p:extLst>
       <p:ext uri="{BB962C8B-B14F-4D97-AF65-F5344CB8AC3E}">
-        <p14:creationId xmlns:p14="http://schemas.microsoft.com/office/powerpoint/2010/main" val="797468573"/>
+        <p14:creationId xmlns:p14="http://schemas.microsoft.com/office/powerpoint/2010/main" val="463498846"/>
       </p:ext>
     </p:extLst>
   </p:cSld>
@@ -5179,12 +4848,236 @@
           </a:prstGeom>
         </p:spPr>
       </p:pic>
+      <p:cxnSp>
+        <p:nvCxnSpPr>
+          <p:cNvPr id="5" name="直線接點 4">
+            <a:extLst>
+              <a:ext uri="{FF2B5EF4-FFF2-40B4-BE49-F238E27FC236}">
+                <a16:creationId xmlns:a16="http://schemas.microsoft.com/office/drawing/2014/main" id="{D5F0CB79-799A-4CC2-98F0-75E3818BB5BB}"/>
+              </a:ext>
+            </a:extLst>
+          </p:cNvPr>
+          <p:cNvCxnSpPr>
+            <a:cxnSpLocks/>
+          </p:cNvCxnSpPr>
+          <p:nvPr/>
+        </p:nvCxnSpPr>
+        <p:spPr>
+          <a:xfrm>
+            <a:off x="678535" y="637564"/>
+            <a:ext cx="285226" cy="503339"/>
+          </a:xfrm>
+          <a:prstGeom prst="line">
+            <a:avLst/>
+          </a:prstGeom>
+          <a:ln w="28575">
+            <a:solidFill>
+              <a:schemeClr val="bg1">
+                <a:lumMod val="50000"/>
+              </a:schemeClr>
+            </a:solidFill>
+          </a:ln>
+        </p:spPr>
+        <p:style>
+          <a:lnRef idx="1">
+            <a:schemeClr val="accent1"/>
+          </a:lnRef>
+          <a:fillRef idx="0">
+            <a:schemeClr val="accent1"/>
+          </a:fillRef>
+          <a:effectRef idx="0">
+            <a:schemeClr val="accent1"/>
+          </a:effectRef>
+          <a:fontRef idx="minor">
+            <a:schemeClr val="tx1"/>
+          </a:fontRef>
+        </p:style>
+      </p:cxnSp>
+      <p:cxnSp>
+        <p:nvCxnSpPr>
+          <p:cNvPr id="6" name="直線接點 5">
+            <a:extLst>
+              <a:ext uri="{FF2B5EF4-FFF2-40B4-BE49-F238E27FC236}">
+                <a16:creationId xmlns:a16="http://schemas.microsoft.com/office/drawing/2014/main" id="{922E2757-E96E-4B60-8304-8FB93A805828}"/>
+              </a:ext>
+            </a:extLst>
+          </p:cNvPr>
+          <p:cNvCxnSpPr>
+            <a:cxnSpLocks/>
+          </p:cNvCxnSpPr>
+          <p:nvPr/>
+        </p:nvCxnSpPr>
+        <p:spPr>
+          <a:xfrm>
+            <a:off x="963761" y="1140903"/>
+            <a:ext cx="3162650" cy="0"/>
+          </a:xfrm>
+          <a:prstGeom prst="line">
+            <a:avLst/>
+          </a:prstGeom>
+          <a:ln w="28575">
+            <a:solidFill>
+              <a:schemeClr val="bg1">
+                <a:lumMod val="50000"/>
+              </a:schemeClr>
+            </a:solidFill>
+          </a:ln>
+        </p:spPr>
+        <p:style>
+          <a:lnRef idx="1">
+            <a:schemeClr val="accent1"/>
+          </a:lnRef>
+          <a:fillRef idx="0">
+            <a:schemeClr val="accent1"/>
+          </a:fillRef>
+          <a:effectRef idx="0">
+            <a:schemeClr val="accent1"/>
+          </a:effectRef>
+          <a:fontRef idx="minor">
+            <a:schemeClr val="tx1"/>
+          </a:fontRef>
+        </p:style>
+      </p:cxnSp>
+      <p:cxnSp>
+        <p:nvCxnSpPr>
+          <p:cNvPr id="7" name="直線接點 6">
+            <a:extLst>
+              <a:ext uri="{FF2B5EF4-FFF2-40B4-BE49-F238E27FC236}">
+                <a16:creationId xmlns:a16="http://schemas.microsoft.com/office/drawing/2014/main" id="{742066B1-934E-4E50-8862-0E4B0976815C}"/>
+              </a:ext>
+            </a:extLst>
+          </p:cNvPr>
+          <p:cNvCxnSpPr>
+            <a:cxnSpLocks/>
+          </p:cNvCxnSpPr>
+          <p:nvPr/>
+        </p:nvCxnSpPr>
+        <p:spPr>
+          <a:xfrm>
+            <a:off x="4126411" y="1140904"/>
+            <a:ext cx="285226" cy="503339"/>
+          </a:xfrm>
+          <a:prstGeom prst="line">
+            <a:avLst/>
+          </a:prstGeom>
+          <a:ln w="28575">
+            <a:solidFill>
+              <a:schemeClr val="bg1">
+                <a:lumMod val="50000"/>
+              </a:schemeClr>
+            </a:solidFill>
+          </a:ln>
+        </p:spPr>
+        <p:style>
+          <a:lnRef idx="1">
+            <a:schemeClr val="accent1"/>
+          </a:lnRef>
+          <a:fillRef idx="0">
+            <a:schemeClr val="accent1"/>
+          </a:fillRef>
+          <a:effectRef idx="0">
+            <a:schemeClr val="accent1"/>
+          </a:effectRef>
+          <a:fontRef idx="minor">
+            <a:schemeClr val="tx1"/>
+          </a:fontRef>
+        </p:style>
+      </p:cxnSp>
+      <p:sp>
+        <p:nvSpPr>
+          <p:cNvPr id="8" name="文字方塊 7">
+            <a:extLst>
+              <a:ext uri="{FF2B5EF4-FFF2-40B4-BE49-F238E27FC236}">
+                <a16:creationId xmlns:a16="http://schemas.microsoft.com/office/drawing/2014/main" id="{F37CB849-7B3F-4D20-B9C9-8EADDC6746E2}"/>
+              </a:ext>
+            </a:extLst>
+          </p:cNvPr>
+          <p:cNvSpPr txBox="1"/>
+          <p:nvPr/>
+        </p:nvSpPr>
+        <p:spPr>
+          <a:xfrm>
+            <a:off x="963761" y="433017"/>
+            <a:ext cx="2682145" cy="707886"/>
+          </a:xfrm>
+          <a:prstGeom prst="rect">
+            <a:avLst/>
+          </a:prstGeom>
+          <a:noFill/>
+        </p:spPr>
+        <p:txBody>
+          <a:bodyPr wrap="none" rtlCol="0">
+            <a:spAutoFit/>
+          </a:bodyPr>
+          <a:lstStyle/>
+          <a:p>
+            <a:r>
+              <a:rPr lang="en-US" altLang="zh-TW" sz="4000" dirty="0">
+                <a:latin typeface="微軟正黑體" panose="020B0604030504040204" pitchFamily="34" charset="-120"/>
+                <a:ea typeface="微軟正黑體" panose="020B0604030504040204" pitchFamily="34" charset="-120"/>
+                <a:cs typeface="Times New Roman" panose="02020603050405020304" pitchFamily="18" charset="0"/>
+                <a:hlinkClick r:id="rId4"/>
+              </a:rPr>
+              <a:t>matplotlib</a:t>
+            </a:r>
+            <a:endParaRPr lang="zh-TW" altLang="en-US" sz="4000" dirty="0">
+              <a:latin typeface="微軟正黑體" panose="020B0604030504040204" pitchFamily="34" charset="-120"/>
+              <a:ea typeface="微軟正黑體" panose="020B0604030504040204" pitchFamily="34" charset="-120"/>
+              <a:cs typeface="Times New Roman" panose="02020603050405020304" pitchFamily="18" charset="0"/>
+            </a:endParaRPr>
+          </a:p>
+        </p:txBody>
+      </p:sp>
+      <p:sp>
+        <p:nvSpPr>
+          <p:cNvPr id="10" name="文字方塊 9">
+            <a:extLst>
+              <a:ext uri="{FF2B5EF4-FFF2-40B4-BE49-F238E27FC236}">
+                <a16:creationId xmlns:a16="http://schemas.microsoft.com/office/drawing/2014/main" id="{7E676790-64E8-4754-B12A-E1C16C54D948}"/>
+              </a:ext>
+            </a:extLst>
+          </p:cNvPr>
+          <p:cNvSpPr txBox="1"/>
+          <p:nvPr/>
+        </p:nvSpPr>
+        <p:spPr>
+          <a:xfrm>
+            <a:off x="1378690" y="5517041"/>
+            <a:ext cx="6386620" cy="400110"/>
+          </a:xfrm>
+          <a:prstGeom prst="rect">
+            <a:avLst/>
+          </a:prstGeom>
+          <a:noFill/>
+        </p:spPr>
+        <p:txBody>
+          <a:bodyPr wrap="none" rtlCol="0">
+            <a:spAutoFit/>
+          </a:bodyPr>
+          <a:lstStyle/>
+          <a:p>
+            <a:r>
+              <a:rPr lang="en-US" altLang="zh-TW" sz="2000" u="sng" dirty="0">
+                <a:solidFill>
+                  <a:srgbClr val="FF0000"/>
+                </a:solidFill>
+              </a:rPr>
+              <a:t>Check out what parameters should be put in each functions</a:t>
+            </a:r>
+            <a:endParaRPr lang="zh-TW" altLang="en-US" sz="2000" u="sng" dirty="0">
+              <a:solidFill>
+                <a:srgbClr val="FF0000"/>
+              </a:solidFill>
+            </a:endParaRPr>
+          </a:p>
+        </p:txBody>
+      </p:sp>
       <p:pic>
         <p:nvPicPr>
-          <p:cNvPr id="9" name="圖片 8" descr="一張含有 螢幕擷取畫面 的圖片&#10;&#10;自動產生的描述">
-            <a:extLst>
-              <a:ext uri="{FF2B5EF4-FFF2-40B4-BE49-F238E27FC236}">
-                <a16:creationId xmlns:a16="http://schemas.microsoft.com/office/drawing/2014/main" id="{90E71E63-51A8-4C50-A2EA-C015EB770692}"/>
+          <p:cNvPr id="11" name="圖片 10" descr="一張含有 螢幕擷取畫面 的圖片&#10;&#10;自動產生的描述">
+            <a:extLst>
+              <a:ext uri="{FF2B5EF4-FFF2-40B4-BE49-F238E27FC236}">
+                <a16:creationId xmlns:a16="http://schemas.microsoft.com/office/drawing/2014/main" id="{4722C2FA-BC24-42DE-9581-6D7405E8D176}"/>
               </a:ext>
             </a:extLst>
           </p:cNvPr>
@@ -5194,7 +5087,7 @@
           <p:nvPr/>
         </p:nvPicPr>
         <p:blipFill>
-          <a:blip r:embed="rId4">
+          <a:blip r:embed="rId5">
             <a:extLst>
               <a:ext uri="{28A0092B-C50C-407E-A947-70E740481C1C}">
                 <a14:useLocalDpi xmlns:a14="http://schemas.microsoft.com/office/drawing/2010/main" val="0"/>
@@ -5207,8 +5100,8 @@
         </p:blipFill>
         <p:spPr>
           <a:xfrm>
-            <a:off x="729808" y="344527"/>
-            <a:ext cx="7684382" cy="2825215"/>
+            <a:off x="1134858" y="1420593"/>
+            <a:ext cx="2389583" cy="3656785"/>
           </a:xfrm>
           <a:prstGeom prst="rect">
             <a:avLst/>
@@ -5217,10 +5110,10 @@
       </p:pic>
       <p:pic>
         <p:nvPicPr>
-          <p:cNvPr id="11" name="圖片 10" descr="一張含有 螢幕擷取畫面 的圖片&#10;&#10;自動產生的描述">
-            <a:extLst>
-              <a:ext uri="{FF2B5EF4-FFF2-40B4-BE49-F238E27FC236}">
-                <a16:creationId xmlns:a16="http://schemas.microsoft.com/office/drawing/2014/main" id="{F4AB5E2B-665B-4BE0-9F88-606249884B63}"/>
+          <p:cNvPr id="12" name="圖片 11" descr="一張含有 螢幕擷取畫面 的圖片&#10;&#10;自動產生的描述">
+            <a:extLst>
+              <a:ext uri="{FF2B5EF4-FFF2-40B4-BE49-F238E27FC236}">
+                <a16:creationId xmlns:a16="http://schemas.microsoft.com/office/drawing/2014/main" id="{1DF7228C-6A44-430A-8726-87E3AAAD40DA}"/>
               </a:ext>
             </a:extLst>
           </p:cNvPr>
@@ -5229,73 +5122,32 @@
           </p:cNvPicPr>
           <p:nvPr/>
         </p:nvPicPr>
-        <p:blipFill rotWithShape="1">
-          <a:blip r:embed="rId5">
+        <p:blipFill>
+          <a:blip r:embed="rId6">
             <a:extLst>
               <a:ext uri="{28A0092B-C50C-407E-A947-70E740481C1C}">
                 <a14:useLocalDpi xmlns:a14="http://schemas.microsoft.com/office/drawing/2010/main" val="0"/>
               </a:ext>
             </a:extLst>
           </a:blip>
-          <a:srcRect r="57547"/>
-          <a:stretch/>
+          <a:stretch>
+            <a:fillRect/>
+          </a:stretch>
         </p:blipFill>
         <p:spPr>
           <a:xfrm>
-            <a:off x="4967795" y="3427091"/>
-            <a:ext cx="3262239" cy="2678585"/>
+            <a:off x="5039500" y="1420593"/>
+            <a:ext cx="2971215" cy="3765702"/>
           </a:xfrm>
           <a:prstGeom prst="rect">
             <a:avLst/>
           </a:prstGeom>
         </p:spPr>
       </p:pic>
-      <p:sp>
-        <p:nvSpPr>
-          <p:cNvPr id="12" name="矩形 11">
-            <a:extLst>
-              <a:ext uri="{FF2B5EF4-FFF2-40B4-BE49-F238E27FC236}">
-                <a16:creationId xmlns:a16="http://schemas.microsoft.com/office/drawing/2014/main" id="{1C1C0AD6-C729-41AC-80D8-929974F13442}"/>
-              </a:ext>
-            </a:extLst>
-          </p:cNvPr>
-          <p:cNvSpPr/>
-          <p:nvPr/>
-        </p:nvSpPr>
-        <p:spPr>
-          <a:xfrm>
-            <a:off x="1619040" y="3427091"/>
-            <a:ext cx="3262240" cy="416396"/>
-          </a:xfrm>
-          <a:prstGeom prst="rect">
-            <a:avLst/>
-          </a:prstGeom>
-        </p:spPr>
-        <p:txBody>
-          <a:bodyPr wrap="none">
-            <a:spAutoFit/>
-          </a:bodyPr>
-          <a:lstStyle/>
-          <a:p>
-            <a:pPr>
-              <a:lnSpc>
-                <a:spcPct val="150000"/>
-              </a:lnSpc>
-            </a:pPr>
-            <a:r>
-              <a:rPr lang="en-US" altLang="zh-TW" sz="1600" b="1" dirty="0">
-                <a:latin typeface="微軟正黑體" panose="020B0604030504040204" pitchFamily="34" charset="-120"/>
-                <a:ea typeface="微軟正黑體" panose="020B0604030504040204" pitchFamily="34" charset="-120"/>
-              </a:rPr>
-              <a:t>You can slice the list and plot it.</a:t>
-            </a:r>
-          </a:p>
-        </p:txBody>
-      </p:sp>
     </p:spTree>
     <p:extLst>
       <p:ext uri="{BB962C8B-B14F-4D97-AF65-F5344CB8AC3E}">
-        <p14:creationId xmlns:p14="http://schemas.microsoft.com/office/powerpoint/2010/main" val="912473192"/>
+        <p14:creationId xmlns:p14="http://schemas.microsoft.com/office/powerpoint/2010/main" val="1612569964"/>
       </p:ext>
     </p:extLst>
   </p:cSld>
@@ -5991,10 +5843,10 @@
       </p:pic>
       <p:sp>
         <p:nvSpPr>
-          <p:cNvPr id="8" name="矩形 7">
-            <a:extLst>
-              <a:ext uri="{FF2B5EF4-FFF2-40B4-BE49-F238E27FC236}">
-                <a16:creationId xmlns:a16="http://schemas.microsoft.com/office/drawing/2014/main" id="{B3CCD8B6-CEA2-4069-BB6E-67A689369320}"/>
+          <p:cNvPr id="5" name="矩形 4">
+            <a:extLst>
+              <a:ext uri="{FF2B5EF4-FFF2-40B4-BE49-F238E27FC236}">
+                <a16:creationId xmlns:a16="http://schemas.microsoft.com/office/drawing/2014/main" id="{AA3ECC21-343E-4408-A40F-0382BA633D21}"/>
               </a:ext>
             </a:extLst>
           </p:cNvPr>
@@ -6003,8 +5855,8 @@
         </p:nvSpPr>
         <p:spPr>
           <a:xfrm>
-            <a:off x="729809" y="533493"/>
-            <a:ext cx="965329" cy="416396"/>
+            <a:off x="729809" y="440693"/>
+            <a:ext cx="2456122" cy="578492"/>
           </a:xfrm>
           <a:prstGeom prst="rect">
             <a:avLst/>
@@ -6022,21 +5874,21 @@
               </a:lnSpc>
             </a:pPr>
             <a:r>
-              <a:rPr lang="en-US" altLang="zh-TW" sz="1600" b="1" dirty="0">
+              <a:rPr lang="en-US" altLang="zh-TW" sz="2400" dirty="0">
                 <a:latin typeface="微軟正黑體" panose="020B0604030504040204" pitchFamily="34" charset="-120"/>
                 <a:ea typeface="微軟正黑體" panose="020B0604030504040204" pitchFamily="34" charset="-120"/>
               </a:rPr>
-              <a:t>Bar plot</a:t>
+              <a:t>Some examples</a:t>
             </a:r>
           </a:p>
         </p:txBody>
       </p:sp>
       <p:pic>
         <p:nvPicPr>
-          <p:cNvPr id="10" name="圖片 9" descr="一張含有 螢幕擷取畫面 的圖片&#10;&#10;自動產生的描述">
-            <a:extLst>
-              <a:ext uri="{FF2B5EF4-FFF2-40B4-BE49-F238E27FC236}">
-                <a16:creationId xmlns:a16="http://schemas.microsoft.com/office/drawing/2014/main" id="{42A5AEEC-C3D8-4259-A36A-D7CA607C5E14}"/>
+          <p:cNvPr id="8" name="圖片 7">
+            <a:extLst>
+              <a:ext uri="{FF2B5EF4-FFF2-40B4-BE49-F238E27FC236}">
+                <a16:creationId xmlns:a16="http://schemas.microsoft.com/office/drawing/2014/main" id="{4200DA8D-0216-46B3-9B7C-F9F2B56DEF71}"/>
               </a:ext>
             </a:extLst>
           </p:cNvPr>
@@ -6059,8 +5911,44 @@
         </p:blipFill>
         <p:spPr>
           <a:xfrm>
-            <a:off x="729809" y="949889"/>
-            <a:ext cx="3554388" cy="2820203"/>
+            <a:off x="729809" y="1378999"/>
+            <a:ext cx="7684382" cy="697655"/>
+          </a:xfrm>
+          <a:prstGeom prst="rect">
+            <a:avLst/>
+          </a:prstGeom>
+        </p:spPr>
+      </p:pic>
+      <p:pic>
+        <p:nvPicPr>
+          <p:cNvPr id="10" name="圖片 9" descr="一張含有 螢幕擷取畫面 的圖片&#10;&#10;自動產生的描述">
+            <a:extLst>
+              <a:ext uri="{FF2B5EF4-FFF2-40B4-BE49-F238E27FC236}">
+                <a16:creationId xmlns:a16="http://schemas.microsoft.com/office/drawing/2014/main" id="{73B11239-8DA8-4182-B7AE-9BD67014E139}"/>
+              </a:ext>
+            </a:extLst>
+          </p:cNvPr>
+          <p:cNvPicPr>
+            <a:picLocks noChangeAspect="1"/>
+          </p:cNvPicPr>
+          <p:nvPr/>
+        </p:nvPicPr>
+        <p:blipFill>
+          <a:blip r:embed="rId5">
+            <a:extLst>
+              <a:ext uri="{28A0092B-C50C-407E-A947-70E740481C1C}">
+                <a14:useLocalDpi xmlns:a14="http://schemas.microsoft.com/office/drawing/2010/main" val="0"/>
+              </a:ext>
+            </a:extLst>
+          </a:blip>
+          <a:stretch>
+            <a:fillRect/>
+          </a:stretch>
+        </p:blipFill>
+        <p:spPr>
+          <a:xfrm>
+            <a:off x="729809" y="2677065"/>
+            <a:ext cx="7693451" cy="3231046"/>
           </a:xfrm>
           <a:prstGeom prst="rect">
             <a:avLst/>
@@ -6072,7 +5960,7 @@
           <p:cNvPr id="11" name="矩形 10">
             <a:extLst>
               <a:ext uri="{FF2B5EF4-FFF2-40B4-BE49-F238E27FC236}">
-                <a16:creationId xmlns:a16="http://schemas.microsoft.com/office/drawing/2014/main" id="{866928DE-68AC-42A3-91B2-8BEF73E4D9FB}"/>
+                <a16:creationId xmlns:a16="http://schemas.microsoft.com/office/drawing/2014/main" id="{C07107BD-2114-4B03-927E-012BF1309FD8}"/>
               </a:ext>
             </a:extLst>
           </p:cNvPr>
@@ -6081,8 +5969,8 @@
         </p:nvSpPr>
         <p:spPr>
           <a:xfrm>
-            <a:off x="4572000" y="2878497"/>
-            <a:ext cx="1226490" cy="416396"/>
+            <a:off x="1178923" y="2168661"/>
+            <a:ext cx="6786153" cy="416396"/>
           </a:xfrm>
           <a:prstGeom prst="rect">
             <a:avLst/>
@@ -6104,51 +5992,15 @@
                 <a:latin typeface="微軟正黑體" panose="020B0604030504040204" pitchFamily="34" charset="-120"/>
                 <a:ea typeface="微軟正黑體" panose="020B0604030504040204" pitchFamily="34" charset="-120"/>
               </a:rPr>
-              <a:t>Customize</a:t>
+              <a:t>You can either plot a list directly or assign some specific X's and Y's.</a:t>
             </a:r>
           </a:p>
         </p:txBody>
       </p:sp>
-      <p:pic>
-        <p:nvPicPr>
-          <p:cNvPr id="13" name="圖片 12" descr="一張含有 螢幕擷取畫面 的圖片&#10;&#10;自動產生的描述">
-            <a:extLst>
-              <a:ext uri="{FF2B5EF4-FFF2-40B4-BE49-F238E27FC236}">
-                <a16:creationId xmlns:a16="http://schemas.microsoft.com/office/drawing/2014/main" id="{D6E2773D-63D9-439A-B4CC-5586E7630C23}"/>
-              </a:ext>
-            </a:extLst>
-          </p:cNvPr>
-          <p:cNvPicPr>
-            <a:picLocks noChangeAspect="1"/>
-          </p:cNvPicPr>
-          <p:nvPr/>
-        </p:nvPicPr>
-        <p:blipFill>
-          <a:blip r:embed="rId5">
-            <a:extLst>
-              <a:ext uri="{28A0092B-C50C-407E-A947-70E740481C1C}">
-                <a14:useLocalDpi xmlns:a14="http://schemas.microsoft.com/office/drawing/2010/main" val="0"/>
-              </a:ext>
-            </a:extLst>
-          </a:blip>
-          <a:stretch>
-            <a:fillRect/>
-          </a:stretch>
-        </p:blipFill>
-        <p:spPr>
-          <a:xfrm>
-            <a:off x="4572000" y="3294894"/>
-            <a:ext cx="3551480" cy="3100875"/>
-          </a:xfrm>
-          <a:prstGeom prst="rect">
-            <a:avLst/>
-          </a:prstGeom>
-        </p:spPr>
-      </p:pic>
     </p:spTree>
     <p:extLst>
       <p:ext uri="{BB962C8B-B14F-4D97-AF65-F5344CB8AC3E}">
-        <p14:creationId xmlns:p14="http://schemas.microsoft.com/office/powerpoint/2010/main" val="699820645"/>
+        <p14:creationId xmlns:p14="http://schemas.microsoft.com/office/powerpoint/2010/main" val="797468573"/>
       </p:ext>
     </p:extLst>
   </p:cSld>
@@ -6249,10 +6101,10 @@
       </p:pic>
       <p:pic>
         <p:nvPicPr>
-          <p:cNvPr id="5" name="圖片 4" descr="一張含有 螢幕擷取畫面 的圖片&#10;&#10;自動產生的描述">
-            <a:extLst>
-              <a:ext uri="{FF2B5EF4-FFF2-40B4-BE49-F238E27FC236}">
-                <a16:creationId xmlns:a16="http://schemas.microsoft.com/office/drawing/2014/main" id="{017F5FC1-29ED-4CFA-BEAF-439D73E4739B}"/>
+          <p:cNvPr id="9" name="圖片 8" descr="一張含有 螢幕擷取畫面 的圖片&#10;&#10;自動產生的描述">
+            <a:extLst>
+              <a:ext uri="{FF2B5EF4-FFF2-40B4-BE49-F238E27FC236}">
+                <a16:creationId xmlns:a16="http://schemas.microsoft.com/office/drawing/2014/main" id="{90E71E63-51A8-4C50-A2EA-C015EB770692}"/>
               </a:ext>
             </a:extLst>
           </p:cNvPr>
@@ -6275,8 +6127,43 @@
         </p:blipFill>
         <p:spPr>
           <a:xfrm>
-            <a:off x="1702175" y="1189519"/>
-            <a:ext cx="5739649" cy="4478962"/>
+            <a:off x="729808" y="344527"/>
+            <a:ext cx="7684382" cy="2825215"/>
+          </a:xfrm>
+          <a:prstGeom prst="rect">
+            <a:avLst/>
+          </a:prstGeom>
+        </p:spPr>
+      </p:pic>
+      <p:pic>
+        <p:nvPicPr>
+          <p:cNvPr id="11" name="圖片 10" descr="一張含有 螢幕擷取畫面 的圖片&#10;&#10;自動產生的描述">
+            <a:extLst>
+              <a:ext uri="{FF2B5EF4-FFF2-40B4-BE49-F238E27FC236}">
+                <a16:creationId xmlns:a16="http://schemas.microsoft.com/office/drawing/2014/main" id="{F4AB5E2B-665B-4BE0-9F88-606249884B63}"/>
+              </a:ext>
+            </a:extLst>
+          </p:cNvPr>
+          <p:cNvPicPr>
+            <a:picLocks noChangeAspect="1"/>
+          </p:cNvPicPr>
+          <p:nvPr/>
+        </p:nvPicPr>
+        <p:blipFill rotWithShape="1">
+          <a:blip r:embed="rId5">
+            <a:extLst>
+              <a:ext uri="{28A0092B-C50C-407E-A947-70E740481C1C}">
+                <a14:useLocalDpi xmlns:a14="http://schemas.microsoft.com/office/drawing/2010/main" val="0"/>
+              </a:ext>
+            </a:extLst>
+          </a:blip>
+          <a:srcRect r="57547"/>
+          <a:stretch/>
+        </p:blipFill>
+        <p:spPr>
+          <a:xfrm>
+            <a:off x="4967795" y="3427091"/>
+            <a:ext cx="3262239" cy="2678585"/>
           </a:xfrm>
           <a:prstGeom prst="rect">
             <a:avLst/>
@@ -6285,10 +6172,10 @@
       </p:pic>
       <p:sp>
         <p:nvSpPr>
-          <p:cNvPr id="6" name="矩形 5">
-            <a:extLst>
-              <a:ext uri="{FF2B5EF4-FFF2-40B4-BE49-F238E27FC236}">
-                <a16:creationId xmlns:a16="http://schemas.microsoft.com/office/drawing/2014/main" id="{52B25D5E-A842-4EEE-8E34-10646778A9D6}"/>
+          <p:cNvPr id="12" name="矩形 11">
+            <a:extLst>
+              <a:ext uri="{FF2B5EF4-FFF2-40B4-BE49-F238E27FC236}">
+                <a16:creationId xmlns:a16="http://schemas.microsoft.com/office/drawing/2014/main" id="{1C1C0AD6-C729-41AC-80D8-929974F13442}"/>
               </a:ext>
             </a:extLst>
           </p:cNvPr>
@@ -6297,8 +6184,8 @@
         </p:nvSpPr>
         <p:spPr>
           <a:xfrm>
-            <a:off x="1308354" y="568953"/>
-            <a:ext cx="2114681" cy="416396"/>
+            <a:off x="1619040" y="3427091"/>
+            <a:ext cx="3262240" cy="416396"/>
           </a:xfrm>
           <a:prstGeom prst="rect">
             <a:avLst/>
@@ -6320,7 +6207,7 @@
                 <a:latin typeface="微軟正黑體" panose="020B0604030504040204" pitchFamily="34" charset="-120"/>
                 <a:ea typeface="微軟正黑體" panose="020B0604030504040204" pitchFamily="34" charset="-120"/>
               </a:rPr>
-              <a:t>Setting X tick labels</a:t>
+              <a:t>You can slice the list and plot it.</a:t>
             </a:r>
           </a:p>
         </p:txBody>
@@ -6328,7 +6215,7 @@
     </p:spTree>
     <p:extLst>
       <p:ext uri="{BB962C8B-B14F-4D97-AF65-F5344CB8AC3E}">
-        <p14:creationId xmlns:p14="http://schemas.microsoft.com/office/powerpoint/2010/main" val="2388961411"/>
+        <p14:creationId xmlns:p14="http://schemas.microsoft.com/office/powerpoint/2010/main" val="912473192"/>
       </p:ext>
     </p:extLst>
   </p:cSld>
@@ -6429,10 +6316,10 @@
       </p:pic>
       <p:sp>
         <p:nvSpPr>
-          <p:cNvPr id="5" name="矩形 4">
-            <a:extLst>
-              <a:ext uri="{FF2B5EF4-FFF2-40B4-BE49-F238E27FC236}">
-                <a16:creationId xmlns:a16="http://schemas.microsoft.com/office/drawing/2014/main" id="{8A82B761-6E25-41CE-9D5A-9439E7E2123E}"/>
+          <p:cNvPr id="8" name="矩形 7">
+            <a:extLst>
+              <a:ext uri="{FF2B5EF4-FFF2-40B4-BE49-F238E27FC236}">
+                <a16:creationId xmlns:a16="http://schemas.microsoft.com/office/drawing/2014/main" id="{B3CCD8B6-CEA2-4069-BB6E-67A689369320}"/>
               </a:ext>
             </a:extLst>
           </p:cNvPr>
@@ -6441,8 +6328,8 @@
         </p:nvSpPr>
         <p:spPr>
           <a:xfrm>
-            <a:off x="1845249" y="602509"/>
-            <a:ext cx="1051891" cy="416396"/>
+            <a:off x="729809" y="533493"/>
+            <a:ext cx="965329" cy="416396"/>
           </a:xfrm>
           <a:prstGeom prst="rect">
             <a:avLst/>
@@ -6464,17 +6351,17 @@
                 <a:latin typeface="微軟正黑體" panose="020B0604030504040204" pitchFamily="34" charset="-120"/>
                 <a:ea typeface="微軟正黑體" panose="020B0604030504040204" pitchFamily="34" charset="-120"/>
               </a:rPr>
-              <a:t>Pie chart</a:t>
+              <a:t>Bar plot</a:t>
             </a:r>
           </a:p>
         </p:txBody>
       </p:sp>
       <p:pic>
         <p:nvPicPr>
-          <p:cNvPr id="6" name="圖片 5" descr="一張含有 螢幕擷取畫面 的圖片&#10;&#10;自動產生的描述">
-            <a:extLst>
-              <a:ext uri="{FF2B5EF4-FFF2-40B4-BE49-F238E27FC236}">
-                <a16:creationId xmlns:a16="http://schemas.microsoft.com/office/drawing/2014/main" id="{F6796FC2-199B-4192-A916-019FB12A391F}"/>
+          <p:cNvPr id="10" name="圖片 9" descr="一張含有 螢幕擷取畫面 的圖片&#10;&#10;自動產生的描述">
+            <a:extLst>
+              <a:ext uri="{FF2B5EF4-FFF2-40B4-BE49-F238E27FC236}">
+                <a16:creationId xmlns:a16="http://schemas.microsoft.com/office/drawing/2014/main" id="{42A5AEEC-C3D8-4259-A36A-D7CA607C5E14}"/>
               </a:ext>
             </a:extLst>
           </p:cNvPr>
@@ -6497,8 +6384,86 @@
         </p:blipFill>
         <p:spPr>
           <a:xfrm>
-            <a:off x="2123630" y="1147645"/>
-            <a:ext cx="4896740" cy="4562710"/>
+            <a:off x="729809" y="949889"/>
+            <a:ext cx="3554388" cy="2820203"/>
+          </a:xfrm>
+          <a:prstGeom prst="rect">
+            <a:avLst/>
+          </a:prstGeom>
+        </p:spPr>
+      </p:pic>
+      <p:sp>
+        <p:nvSpPr>
+          <p:cNvPr id="11" name="矩形 10">
+            <a:extLst>
+              <a:ext uri="{FF2B5EF4-FFF2-40B4-BE49-F238E27FC236}">
+                <a16:creationId xmlns:a16="http://schemas.microsoft.com/office/drawing/2014/main" id="{866928DE-68AC-42A3-91B2-8BEF73E4D9FB}"/>
+              </a:ext>
+            </a:extLst>
+          </p:cNvPr>
+          <p:cNvSpPr/>
+          <p:nvPr/>
+        </p:nvSpPr>
+        <p:spPr>
+          <a:xfrm>
+            <a:off x="4572000" y="2878497"/>
+            <a:ext cx="1226490" cy="416396"/>
+          </a:xfrm>
+          <a:prstGeom prst="rect">
+            <a:avLst/>
+          </a:prstGeom>
+        </p:spPr>
+        <p:txBody>
+          <a:bodyPr wrap="none">
+            <a:spAutoFit/>
+          </a:bodyPr>
+          <a:lstStyle/>
+          <a:p>
+            <a:pPr>
+              <a:lnSpc>
+                <a:spcPct val="150000"/>
+              </a:lnSpc>
+            </a:pPr>
+            <a:r>
+              <a:rPr lang="en-US" altLang="zh-TW" sz="1600" b="1" dirty="0">
+                <a:latin typeface="微軟正黑體" panose="020B0604030504040204" pitchFamily="34" charset="-120"/>
+                <a:ea typeface="微軟正黑體" panose="020B0604030504040204" pitchFamily="34" charset="-120"/>
+              </a:rPr>
+              <a:t>Customize</a:t>
+            </a:r>
+          </a:p>
+        </p:txBody>
+      </p:sp>
+      <p:pic>
+        <p:nvPicPr>
+          <p:cNvPr id="13" name="圖片 12" descr="一張含有 螢幕擷取畫面 的圖片&#10;&#10;自動產生的描述">
+            <a:extLst>
+              <a:ext uri="{FF2B5EF4-FFF2-40B4-BE49-F238E27FC236}">
+                <a16:creationId xmlns:a16="http://schemas.microsoft.com/office/drawing/2014/main" id="{D6E2773D-63D9-439A-B4CC-5586E7630C23}"/>
+              </a:ext>
+            </a:extLst>
+          </p:cNvPr>
+          <p:cNvPicPr>
+            <a:picLocks noChangeAspect="1"/>
+          </p:cNvPicPr>
+          <p:nvPr/>
+        </p:nvPicPr>
+        <p:blipFill>
+          <a:blip r:embed="rId5">
+            <a:extLst>
+              <a:ext uri="{28A0092B-C50C-407E-A947-70E740481C1C}">
+                <a14:useLocalDpi xmlns:a14="http://schemas.microsoft.com/office/drawing/2010/main" val="0"/>
+              </a:ext>
+            </a:extLst>
+          </a:blip>
+          <a:stretch>
+            <a:fillRect/>
+          </a:stretch>
+        </p:blipFill>
+        <p:spPr>
+          <a:xfrm>
+            <a:off x="4572000" y="3294894"/>
+            <a:ext cx="3551480" cy="3100875"/>
           </a:xfrm>
           <a:prstGeom prst="rect">
             <a:avLst/>
@@ -6508,7 +6473,7 @@
     </p:spTree>
     <p:extLst>
       <p:ext uri="{BB962C8B-B14F-4D97-AF65-F5344CB8AC3E}">
-        <p14:creationId xmlns:p14="http://schemas.microsoft.com/office/powerpoint/2010/main" val="832152175"/>
+        <p14:creationId xmlns:p14="http://schemas.microsoft.com/office/powerpoint/2010/main" val="699820645"/>
       </p:ext>
     </p:extLst>
   </p:cSld>
@@ -6607,12 +6572,48 @@
           </a:prstGeom>
         </p:spPr>
       </p:pic>
+      <p:pic>
+        <p:nvPicPr>
+          <p:cNvPr id="5" name="圖片 4" descr="一張含有 螢幕擷取畫面 的圖片&#10;&#10;自動產生的描述">
+            <a:extLst>
+              <a:ext uri="{FF2B5EF4-FFF2-40B4-BE49-F238E27FC236}">
+                <a16:creationId xmlns:a16="http://schemas.microsoft.com/office/drawing/2014/main" id="{017F5FC1-29ED-4CFA-BEAF-439D73E4739B}"/>
+              </a:ext>
+            </a:extLst>
+          </p:cNvPr>
+          <p:cNvPicPr>
+            <a:picLocks noChangeAspect="1"/>
+          </p:cNvPicPr>
+          <p:nvPr/>
+        </p:nvPicPr>
+        <p:blipFill>
+          <a:blip r:embed="rId4">
+            <a:extLst>
+              <a:ext uri="{28A0092B-C50C-407E-A947-70E740481C1C}">
+                <a14:useLocalDpi xmlns:a14="http://schemas.microsoft.com/office/drawing/2010/main" val="0"/>
+              </a:ext>
+            </a:extLst>
+          </a:blip>
+          <a:stretch>
+            <a:fillRect/>
+          </a:stretch>
+        </p:blipFill>
+        <p:spPr>
+          <a:xfrm>
+            <a:off x="1702175" y="1189519"/>
+            <a:ext cx="5739649" cy="4478962"/>
+          </a:xfrm>
+          <a:prstGeom prst="rect">
+            <a:avLst/>
+          </a:prstGeom>
+        </p:spPr>
+      </p:pic>
       <p:sp>
         <p:nvSpPr>
-          <p:cNvPr id="5" name="矩形 4">
-            <a:extLst>
-              <a:ext uri="{FF2B5EF4-FFF2-40B4-BE49-F238E27FC236}">
-                <a16:creationId xmlns:a16="http://schemas.microsoft.com/office/drawing/2014/main" id="{1341B138-41AE-4BCD-BC80-D6FD45EAD2FD}"/>
+          <p:cNvPr id="6" name="矩形 5">
+            <a:extLst>
+              <a:ext uri="{FF2B5EF4-FFF2-40B4-BE49-F238E27FC236}">
+                <a16:creationId xmlns:a16="http://schemas.microsoft.com/office/drawing/2014/main" id="{52B25D5E-A842-4EEE-8E34-10646778A9D6}"/>
               </a:ext>
             </a:extLst>
           </p:cNvPr>
@@ -6621,8 +6622,8 @@
         </p:nvSpPr>
         <p:spPr>
           <a:xfrm>
-            <a:off x="684179" y="457993"/>
-            <a:ext cx="1061509" cy="416396"/>
+            <a:off x="1308354" y="568953"/>
+            <a:ext cx="2114681" cy="416396"/>
           </a:xfrm>
           <a:prstGeom prst="rect">
             <a:avLst/>
@@ -6644,51 +6645,15 @@
                 <a:latin typeface="微軟正黑體" panose="020B0604030504040204" pitchFamily="34" charset="-120"/>
                 <a:ea typeface="微軟正黑體" panose="020B0604030504040204" pitchFamily="34" charset="-120"/>
               </a:rPr>
-              <a:t>Subplots</a:t>
+              <a:t>Setting X tick labels</a:t>
             </a:r>
           </a:p>
         </p:txBody>
       </p:sp>
-      <p:pic>
-        <p:nvPicPr>
-          <p:cNvPr id="7" name="圖片 6" descr="一張含有 地圖 的圖片&#10;&#10;自動產生的描述">
-            <a:extLst>
-              <a:ext uri="{FF2B5EF4-FFF2-40B4-BE49-F238E27FC236}">
-                <a16:creationId xmlns:a16="http://schemas.microsoft.com/office/drawing/2014/main" id="{EF95FB7A-3DDE-45C1-8144-07D2A279219C}"/>
-              </a:ext>
-            </a:extLst>
-          </p:cNvPr>
-          <p:cNvPicPr>
-            <a:picLocks noChangeAspect="1"/>
-          </p:cNvPicPr>
-          <p:nvPr/>
-        </p:nvPicPr>
-        <p:blipFill>
-          <a:blip r:embed="rId4">
-            <a:extLst>
-              <a:ext uri="{28A0092B-C50C-407E-A947-70E740481C1C}">
-                <a14:useLocalDpi xmlns:a14="http://schemas.microsoft.com/office/drawing/2010/main" val="0"/>
-              </a:ext>
-            </a:extLst>
-          </a:blip>
-          <a:stretch>
-            <a:fillRect/>
-          </a:stretch>
-        </p:blipFill>
-        <p:spPr>
-          <a:xfrm>
-            <a:off x="684179" y="1000655"/>
-            <a:ext cx="7775641" cy="4856690"/>
-          </a:xfrm>
-          <a:prstGeom prst="rect">
-            <a:avLst/>
-          </a:prstGeom>
-        </p:spPr>
-      </p:pic>
     </p:spTree>
     <p:extLst>
       <p:ext uri="{BB962C8B-B14F-4D97-AF65-F5344CB8AC3E}">
-        <p14:creationId xmlns:p14="http://schemas.microsoft.com/office/powerpoint/2010/main" val="1204964469"/>
+        <p14:creationId xmlns:p14="http://schemas.microsoft.com/office/powerpoint/2010/main" val="2388961411"/>
       </p:ext>
     </p:extLst>
   </p:cSld>
@@ -6792,7 +6757,7 @@
           <p:cNvPr id="5" name="矩形 4">
             <a:extLst>
               <a:ext uri="{FF2B5EF4-FFF2-40B4-BE49-F238E27FC236}">
-                <a16:creationId xmlns:a16="http://schemas.microsoft.com/office/drawing/2014/main" id="{92082ACA-0A28-4638-9D6E-3BB57713A6B7}"/>
+                <a16:creationId xmlns:a16="http://schemas.microsoft.com/office/drawing/2014/main" id="{8A82B761-6E25-41CE-9D5A-9439E7E2123E}"/>
               </a:ext>
             </a:extLst>
           </p:cNvPr>
@@ -6802,7 +6767,7 @@
         <p:spPr>
           <a:xfrm>
             <a:off x="1845249" y="602509"/>
-            <a:ext cx="1329082" cy="416396"/>
+            <a:ext cx="1051891" cy="416396"/>
           </a:xfrm>
           <a:prstGeom prst="rect">
             <a:avLst/>
@@ -6824,17 +6789,17 @@
                 <a:latin typeface="微軟正黑體" panose="020B0604030504040204" pitchFamily="34" charset="-120"/>
                 <a:ea typeface="微軟正黑體" panose="020B0604030504040204" pitchFamily="34" charset="-120"/>
               </a:rPr>
-              <a:t>Scatter plot</a:t>
+              <a:t>Pie chart</a:t>
             </a:r>
           </a:p>
         </p:txBody>
       </p:sp>
       <p:pic>
         <p:nvPicPr>
-          <p:cNvPr id="6" name="圖片 5" descr="一張含有 地圖 的圖片&#10;&#10;自動產生的描述">
-            <a:extLst>
-              <a:ext uri="{FF2B5EF4-FFF2-40B4-BE49-F238E27FC236}">
-                <a16:creationId xmlns:a16="http://schemas.microsoft.com/office/drawing/2014/main" id="{F8CBEBFF-3D9E-493A-B869-775B166A3EE2}"/>
+          <p:cNvPr id="6" name="圖片 5" descr="一張含有 螢幕擷取畫面 的圖片&#10;&#10;自動產生的描述">
+            <a:extLst>
+              <a:ext uri="{FF2B5EF4-FFF2-40B4-BE49-F238E27FC236}">
+                <a16:creationId xmlns:a16="http://schemas.microsoft.com/office/drawing/2014/main" id="{F6796FC2-199B-4192-A916-019FB12A391F}"/>
               </a:ext>
             </a:extLst>
           </p:cNvPr>
@@ -6858,7 +6823,7 @@
         <p:spPr>
           <a:xfrm>
             <a:off x="2123630" y="1147645"/>
-            <a:ext cx="4895476" cy="4036498"/>
+            <a:ext cx="4896740" cy="4562710"/>
           </a:xfrm>
           <a:prstGeom prst="rect">
             <a:avLst/>
@@ -6868,7 +6833,7 @@
     </p:spTree>
     <p:extLst>
       <p:ext uri="{BB962C8B-B14F-4D97-AF65-F5344CB8AC3E}">
-        <p14:creationId xmlns:p14="http://schemas.microsoft.com/office/powerpoint/2010/main" val="2700069183"/>
+        <p14:creationId xmlns:p14="http://schemas.microsoft.com/office/powerpoint/2010/main" val="832152175"/>
       </p:ext>
     </p:extLst>
   </p:cSld>
@@ -6972,7 +6937,7 @@
           <p:cNvPr id="5" name="矩形 4">
             <a:extLst>
               <a:ext uri="{FF2B5EF4-FFF2-40B4-BE49-F238E27FC236}">
-                <a16:creationId xmlns:a16="http://schemas.microsoft.com/office/drawing/2014/main" id="{C860DBAF-3D6F-4336-ACC8-B0FC73298DE9}"/>
+                <a16:creationId xmlns:a16="http://schemas.microsoft.com/office/drawing/2014/main" id="{1341B138-41AE-4BCD-BC80-D6FD45EAD2FD}"/>
               </a:ext>
             </a:extLst>
           </p:cNvPr>
@@ -6981,8 +6946,8 @@
         </p:nvSpPr>
         <p:spPr>
           <a:xfrm>
-            <a:off x="729809" y="533493"/>
-            <a:ext cx="2069413" cy="416396"/>
+            <a:off x="684179" y="457993"/>
+            <a:ext cx="1061509" cy="416396"/>
           </a:xfrm>
           <a:prstGeom prst="rect">
             <a:avLst/>
@@ -7004,17 +6969,17 @@
                 <a:latin typeface="微軟正黑體" panose="020B0604030504040204" pitchFamily="34" charset="-120"/>
                 <a:ea typeface="微軟正黑體" panose="020B0604030504040204" pitchFamily="34" charset="-120"/>
               </a:rPr>
-              <a:t>Real world data……</a:t>
+              <a:t>Subplots</a:t>
             </a:r>
           </a:p>
         </p:txBody>
       </p:sp>
       <p:pic>
         <p:nvPicPr>
-          <p:cNvPr id="6" name="圖片 5" descr="一張含有 螢幕擷取畫面 的圖片&#10;&#10;自動產生的描述">
-            <a:extLst>
-              <a:ext uri="{FF2B5EF4-FFF2-40B4-BE49-F238E27FC236}">
-                <a16:creationId xmlns:a16="http://schemas.microsoft.com/office/drawing/2014/main" id="{7AA6C4C5-35CB-48CB-A5CB-DCBC06EB0FA9}"/>
+          <p:cNvPr id="7" name="圖片 6" descr="一張含有 地圖 的圖片&#10;&#10;自動產生的描述">
+            <a:extLst>
+              <a:ext uri="{FF2B5EF4-FFF2-40B4-BE49-F238E27FC236}">
+                <a16:creationId xmlns:a16="http://schemas.microsoft.com/office/drawing/2014/main" id="{EF95FB7A-3DDE-45C1-8144-07D2A279219C}"/>
               </a:ext>
             </a:extLst>
           </p:cNvPr>
@@ -7037,8 +7002,8 @@
         </p:blipFill>
         <p:spPr>
           <a:xfrm>
-            <a:off x="1627815" y="1062246"/>
-            <a:ext cx="5888370" cy="4733508"/>
+            <a:off x="684179" y="1000655"/>
+            <a:ext cx="7775641" cy="4856690"/>
           </a:xfrm>
           <a:prstGeom prst="rect">
             <a:avLst/>
@@ -7048,7 +7013,7 @@
     </p:spTree>
     <p:extLst>
       <p:ext uri="{BB962C8B-B14F-4D97-AF65-F5344CB8AC3E}">
-        <p14:creationId xmlns:p14="http://schemas.microsoft.com/office/powerpoint/2010/main" val="2059185028"/>
+        <p14:creationId xmlns:p14="http://schemas.microsoft.com/office/powerpoint/2010/main" val="1204964469"/>
       </p:ext>
     </p:extLst>
   </p:cSld>
@@ -7147,12 +7112,54 @@
           </a:prstGeom>
         </p:spPr>
       </p:pic>
+      <p:sp>
+        <p:nvSpPr>
+          <p:cNvPr id="5" name="矩形 4">
+            <a:extLst>
+              <a:ext uri="{FF2B5EF4-FFF2-40B4-BE49-F238E27FC236}">
+                <a16:creationId xmlns:a16="http://schemas.microsoft.com/office/drawing/2014/main" id="{92082ACA-0A28-4638-9D6E-3BB57713A6B7}"/>
+              </a:ext>
+            </a:extLst>
+          </p:cNvPr>
+          <p:cNvSpPr/>
+          <p:nvPr/>
+        </p:nvSpPr>
+        <p:spPr>
+          <a:xfrm>
+            <a:off x="1845249" y="602509"/>
+            <a:ext cx="1329082" cy="416396"/>
+          </a:xfrm>
+          <a:prstGeom prst="rect">
+            <a:avLst/>
+          </a:prstGeom>
+        </p:spPr>
+        <p:txBody>
+          <a:bodyPr wrap="none">
+            <a:spAutoFit/>
+          </a:bodyPr>
+          <a:lstStyle/>
+          <a:p>
+            <a:pPr>
+              <a:lnSpc>
+                <a:spcPct val="150000"/>
+              </a:lnSpc>
+            </a:pPr>
+            <a:r>
+              <a:rPr lang="en-US" altLang="zh-TW" sz="1600" b="1" dirty="0">
+                <a:latin typeface="微軟正黑體" panose="020B0604030504040204" pitchFamily="34" charset="-120"/>
+                <a:ea typeface="微軟正黑體" panose="020B0604030504040204" pitchFamily="34" charset="-120"/>
+              </a:rPr>
+              <a:t>Scatter plot</a:t>
+            </a:r>
+          </a:p>
+        </p:txBody>
+      </p:sp>
       <p:pic>
         <p:nvPicPr>
-          <p:cNvPr id="5" name="圖片 4" descr="一張含有 螢幕擷取畫面 的圖片&#10;&#10;自動產生的描述">
-            <a:extLst>
-              <a:ext uri="{FF2B5EF4-FFF2-40B4-BE49-F238E27FC236}">
-                <a16:creationId xmlns:a16="http://schemas.microsoft.com/office/drawing/2014/main" id="{48B99C3B-6244-40F5-A085-EC716612A527}"/>
+          <p:cNvPr id="6" name="圖片 5" descr="一張含有 地圖 的圖片&#10;&#10;自動產生的描述">
+            <a:extLst>
+              <a:ext uri="{FF2B5EF4-FFF2-40B4-BE49-F238E27FC236}">
+                <a16:creationId xmlns:a16="http://schemas.microsoft.com/office/drawing/2014/main" id="{F8CBEBFF-3D9E-493A-B869-775B166A3EE2}"/>
               </a:ext>
             </a:extLst>
           </p:cNvPr>
@@ -7161,7 +7168,7 @@
           </p:cNvPicPr>
           <p:nvPr/>
         </p:nvPicPr>
-        <p:blipFill rotWithShape="1">
+        <p:blipFill>
           <a:blip r:embed="rId4">
             <a:extLst>
               <a:ext uri="{28A0092B-C50C-407E-A947-70E740481C1C}">
@@ -7169,13 +7176,14 @@
               </a:ext>
             </a:extLst>
           </a:blip>
-          <a:srcRect r="50004"/>
-          <a:stretch/>
+          <a:stretch>
+            <a:fillRect/>
+          </a:stretch>
         </p:blipFill>
         <p:spPr>
           <a:xfrm>
-            <a:off x="1627815" y="741301"/>
-            <a:ext cx="5888370" cy="5375398"/>
+            <a:off x="2123630" y="1147645"/>
+            <a:ext cx="4895476" cy="4036498"/>
           </a:xfrm>
           <a:prstGeom prst="rect">
             <a:avLst/>
@@ -7185,7 +7193,7 @@
     </p:spTree>
     <p:extLst>
       <p:ext uri="{BB962C8B-B14F-4D97-AF65-F5344CB8AC3E}">
-        <p14:creationId xmlns:p14="http://schemas.microsoft.com/office/powerpoint/2010/main" val="4201013775"/>
+        <p14:creationId xmlns:p14="http://schemas.microsoft.com/office/powerpoint/2010/main" val="2700069183"/>
       </p:ext>
     </p:extLst>
   </p:cSld>
@@ -7284,12 +7292,54 @@
           </a:prstGeom>
         </p:spPr>
       </p:pic>
+      <p:sp>
+        <p:nvSpPr>
+          <p:cNvPr id="5" name="矩形 4">
+            <a:extLst>
+              <a:ext uri="{FF2B5EF4-FFF2-40B4-BE49-F238E27FC236}">
+                <a16:creationId xmlns:a16="http://schemas.microsoft.com/office/drawing/2014/main" id="{C860DBAF-3D6F-4336-ACC8-B0FC73298DE9}"/>
+              </a:ext>
+            </a:extLst>
+          </p:cNvPr>
+          <p:cNvSpPr/>
+          <p:nvPr/>
+        </p:nvSpPr>
+        <p:spPr>
+          <a:xfrm>
+            <a:off x="729809" y="533493"/>
+            <a:ext cx="2069413" cy="416396"/>
+          </a:xfrm>
+          <a:prstGeom prst="rect">
+            <a:avLst/>
+          </a:prstGeom>
+        </p:spPr>
+        <p:txBody>
+          <a:bodyPr wrap="none">
+            <a:spAutoFit/>
+          </a:bodyPr>
+          <a:lstStyle/>
+          <a:p>
+            <a:pPr>
+              <a:lnSpc>
+                <a:spcPct val="150000"/>
+              </a:lnSpc>
+            </a:pPr>
+            <a:r>
+              <a:rPr lang="en-US" altLang="zh-TW" sz="1600" b="1" dirty="0">
+                <a:latin typeface="微軟正黑體" panose="020B0604030504040204" pitchFamily="34" charset="-120"/>
+                <a:ea typeface="微軟正黑體" panose="020B0604030504040204" pitchFamily="34" charset="-120"/>
+              </a:rPr>
+              <a:t>Real world data……</a:t>
+            </a:r>
+          </a:p>
+        </p:txBody>
+      </p:sp>
       <p:pic>
         <p:nvPicPr>
-          <p:cNvPr id="5" name="圖片 4" descr="一張含有 螢幕擷取畫面 的圖片&#10;&#10;自動產生的描述">
-            <a:extLst>
-              <a:ext uri="{FF2B5EF4-FFF2-40B4-BE49-F238E27FC236}">
-                <a16:creationId xmlns:a16="http://schemas.microsoft.com/office/drawing/2014/main" id="{B9BC734C-7985-4E8C-8F3B-7342113B0113}"/>
+          <p:cNvPr id="6" name="圖片 5" descr="一張含有 螢幕擷取畫面 的圖片&#10;&#10;自動產生的描述">
+            <a:extLst>
+              <a:ext uri="{FF2B5EF4-FFF2-40B4-BE49-F238E27FC236}">
+                <a16:creationId xmlns:a16="http://schemas.microsoft.com/office/drawing/2014/main" id="{7AA6C4C5-35CB-48CB-A5CB-DCBC06EB0FA9}"/>
               </a:ext>
             </a:extLst>
           </p:cNvPr>
@@ -7312,8 +7362,8 @@
         </p:blipFill>
         <p:spPr>
           <a:xfrm>
-            <a:off x="2022051" y="583630"/>
-            <a:ext cx="5099897" cy="5690739"/>
+            <a:off x="1627815" y="1062246"/>
+            <a:ext cx="5888370" cy="4733508"/>
           </a:xfrm>
           <a:prstGeom prst="rect">
             <a:avLst/>
@@ -7323,7 +7373,7 @@
     </p:spTree>
     <p:extLst>
       <p:ext uri="{BB962C8B-B14F-4D97-AF65-F5344CB8AC3E}">
-        <p14:creationId xmlns:p14="http://schemas.microsoft.com/office/powerpoint/2010/main" val="9219675"/>
+        <p14:creationId xmlns:p14="http://schemas.microsoft.com/office/powerpoint/2010/main" val="2059185028"/>
       </p:ext>
     </p:extLst>
   </p:cSld>
@@ -7422,124 +7472,183 @@
           </a:prstGeom>
         </p:spPr>
       </p:pic>
-      <p:sp>
-        <p:nvSpPr>
-          <p:cNvPr id="5" name="文字方塊 4">
-            <a:extLst>
-              <a:ext uri="{FF2B5EF4-FFF2-40B4-BE49-F238E27FC236}">
-                <a16:creationId xmlns:a16="http://schemas.microsoft.com/office/drawing/2014/main" id="{91A50393-F597-4A23-9EA5-079944A6AFA0}"/>
-              </a:ext>
-            </a:extLst>
-          </p:cNvPr>
-          <p:cNvSpPr txBox="1"/>
-          <p:nvPr/>
-        </p:nvSpPr>
-        <p:spPr>
-          <a:xfrm>
-            <a:off x="1161603" y="1262963"/>
-            <a:ext cx="5830892" cy="1493101"/>
-          </a:xfrm>
-          <a:prstGeom prst="rect">
-            <a:avLst/>
-          </a:prstGeom>
-          <a:noFill/>
-        </p:spPr>
-        <p:txBody>
-          <a:bodyPr wrap="none" rtlCol="0">
-            <a:spAutoFit/>
-          </a:bodyPr>
-          <a:lstStyle/>
-          <a:p>
-            <a:pPr>
-              <a:lnSpc>
-                <a:spcPct val="150000"/>
-              </a:lnSpc>
-            </a:pPr>
-            <a:r>
-              <a:rPr lang="en-US" altLang="zh-TW" sz="3200" dirty="0">
-                <a:latin typeface="Arial Black" panose="020B0A04020102020204" pitchFamily="34" charset="0"/>
-                <a:ea typeface="微軟正黑體" panose="020B0604030504040204" pitchFamily="34" charset="-120"/>
-              </a:rPr>
-              <a:t>For most functions, </a:t>
-            </a:r>
-          </a:p>
-          <a:p>
-            <a:pPr>
-              <a:lnSpc>
-                <a:spcPct val="150000"/>
-              </a:lnSpc>
-            </a:pPr>
-            <a:r>
-              <a:rPr lang="en-US" altLang="zh-TW" sz="3200" dirty="0">
-                <a:latin typeface="Arial Black" panose="020B0A04020102020204" pitchFamily="34" charset="0"/>
-                <a:ea typeface="微軟正黑體" panose="020B0604030504040204" pitchFamily="34" charset="-120"/>
-              </a:rPr>
-              <a:t>you don’t have to build it.</a:t>
-            </a:r>
-          </a:p>
-        </p:txBody>
-      </p:sp>
-      <p:sp>
-        <p:nvSpPr>
-          <p:cNvPr id="6" name="文字方塊 5">
-            <a:extLst>
-              <a:ext uri="{FF2B5EF4-FFF2-40B4-BE49-F238E27FC236}">
-                <a16:creationId xmlns:a16="http://schemas.microsoft.com/office/drawing/2014/main" id="{E02F6E03-34CB-40F3-8AE9-D60F8B92935F}"/>
-              </a:ext>
-            </a:extLst>
-          </p:cNvPr>
-          <p:cNvSpPr txBox="1"/>
-          <p:nvPr/>
-        </p:nvSpPr>
-        <p:spPr>
-          <a:xfrm>
-            <a:off x="2597202" y="3429000"/>
-            <a:ext cx="5493170" cy="1493101"/>
-          </a:xfrm>
-          <a:prstGeom prst="rect">
-            <a:avLst/>
-          </a:prstGeom>
-          <a:noFill/>
-        </p:spPr>
-        <p:txBody>
-          <a:bodyPr wrap="none" rtlCol="0">
-            <a:spAutoFit/>
-          </a:bodyPr>
-          <a:lstStyle/>
-          <a:p>
-            <a:pPr>
-              <a:lnSpc>
-                <a:spcPct val="150000"/>
-              </a:lnSpc>
-            </a:pPr>
-            <a:r>
-              <a:rPr lang="en-US" altLang="zh-TW" sz="3200" dirty="0">
-                <a:latin typeface="Arial Black" panose="020B0A04020102020204" pitchFamily="34" charset="0"/>
-                <a:ea typeface="微軟正黑體" panose="020B0604030504040204" pitchFamily="34" charset="-120"/>
-              </a:rPr>
-              <a:t>You only need to find it </a:t>
-            </a:r>
-          </a:p>
-          <a:p>
-            <a:pPr>
-              <a:lnSpc>
-                <a:spcPct val="150000"/>
-              </a:lnSpc>
-            </a:pPr>
-            <a:r>
-              <a:rPr lang="en-US" altLang="zh-TW" sz="3200" dirty="0">
-                <a:latin typeface="Arial Black" panose="020B0A04020102020204" pitchFamily="34" charset="0"/>
-                <a:ea typeface="微軟正黑體" panose="020B0604030504040204" pitchFamily="34" charset="-120"/>
-              </a:rPr>
-              <a:t>and learn how to use it.</a:t>
-            </a:r>
-          </a:p>
-        </p:txBody>
-      </p:sp>
+      <p:pic>
+        <p:nvPicPr>
+          <p:cNvPr id="5" name="圖片 4" descr="一張含有 螢幕擷取畫面 的圖片&#10;&#10;自動產生的描述">
+            <a:extLst>
+              <a:ext uri="{FF2B5EF4-FFF2-40B4-BE49-F238E27FC236}">
+                <a16:creationId xmlns:a16="http://schemas.microsoft.com/office/drawing/2014/main" id="{48B99C3B-6244-40F5-A085-EC716612A527}"/>
+              </a:ext>
+            </a:extLst>
+          </p:cNvPr>
+          <p:cNvPicPr>
+            <a:picLocks noChangeAspect="1"/>
+          </p:cNvPicPr>
+          <p:nvPr/>
+        </p:nvPicPr>
+        <p:blipFill rotWithShape="1">
+          <a:blip r:embed="rId4">
+            <a:extLst>
+              <a:ext uri="{28A0092B-C50C-407E-A947-70E740481C1C}">
+                <a14:useLocalDpi xmlns:a14="http://schemas.microsoft.com/office/drawing/2010/main" val="0"/>
+              </a:ext>
+            </a:extLst>
+          </a:blip>
+          <a:srcRect r="50004"/>
+          <a:stretch/>
+        </p:blipFill>
+        <p:spPr>
+          <a:xfrm>
+            <a:off x="1627815" y="741301"/>
+            <a:ext cx="5888370" cy="5375398"/>
+          </a:xfrm>
+          <a:prstGeom prst="rect">
+            <a:avLst/>
+          </a:prstGeom>
+        </p:spPr>
+      </p:pic>
     </p:spTree>
     <p:extLst>
       <p:ext uri="{BB962C8B-B14F-4D97-AF65-F5344CB8AC3E}">
-        <p14:creationId xmlns:p14="http://schemas.microsoft.com/office/powerpoint/2010/main" val="3958962463"/>
+        <p14:creationId xmlns:p14="http://schemas.microsoft.com/office/powerpoint/2010/main" val="4201013775"/>
+      </p:ext>
+    </p:extLst>
+  </p:cSld>
+  <p:clrMapOvr>
+    <a:masterClrMapping/>
+  </p:clrMapOvr>
+</p:sld>
+</file>
+
+<file path=ppt/slides/slide29.xml><?xml version="1.0" encoding="utf-8"?>
+<p:sld xmlns:a="http://schemas.openxmlformats.org/drawingml/2006/main" xmlns:r="http://schemas.openxmlformats.org/officeDocument/2006/relationships" xmlns:p="http://schemas.openxmlformats.org/presentationml/2006/main">
+  <p:cSld>
+    <p:spTree>
+      <p:nvGrpSpPr>
+        <p:cNvPr id="1" name=""/>
+        <p:cNvGrpSpPr/>
+        <p:nvPr/>
+      </p:nvGrpSpPr>
+      <p:grpSpPr>
+        <a:xfrm>
+          <a:off x="0" y="0"/>
+          <a:ext cx="0" cy="0"/>
+          <a:chOff x="0" y="0"/>
+          <a:chExt cx="0" cy="0"/>
+        </a:xfrm>
+      </p:grpSpPr>
+      <p:pic>
+        <p:nvPicPr>
+          <p:cNvPr id="3" name="圖片 2">
+            <a:extLst>
+              <a:ext uri="{FF2B5EF4-FFF2-40B4-BE49-F238E27FC236}">
+                <a16:creationId xmlns:a16="http://schemas.microsoft.com/office/drawing/2014/main" id="{1202EBDE-7F64-43BD-86B7-6C228CCEC2D0}"/>
+              </a:ext>
+            </a:extLst>
+          </p:cNvPr>
+          <p:cNvPicPr>
+            <a:picLocks noChangeAspect="1"/>
+          </p:cNvPicPr>
+          <p:nvPr/>
+        </p:nvPicPr>
+        <p:blipFill>
+          <a:blip r:embed="rId2" cstate="print">
+            <a:extLst>
+              <a:ext uri="{28A0092B-C50C-407E-A947-70E740481C1C}">
+                <a14:useLocalDpi xmlns:a14="http://schemas.microsoft.com/office/drawing/2010/main" val="0"/>
+              </a:ext>
+            </a:extLst>
+          </a:blip>
+          <a:stretch>
+            <a:fillRect/>
+          </a:stretch>
+        </p:blipFill>
+        <p:spPr>
+          <a:xfrm>
+            <a:off x="6598915" y="0"/>
+            <a:ext cx="2545085" cy="3294895"/>
+          </a:xfrm>
+          <a:prstGeom prst="rect">
+            <a:avLst/>
+          </a:prstGeom>
+        </p:spPr>
+      </p:pic>
+      <p:pic>
+        <p:nvPicPr>
+          <p:cNvPr id="4" name="圖片 3">
+            <a:extLst>
+              <a:ext uri="{FF2B5EF4-FFF2-40B4-BE49-F238E27FC236}">
+                <a16:creationId xmlns:a16="http://schemas.microsoft.com/office/drawing/2014/main" id="{AEFF5069-0FA7-44E7-AEEE-225463C6B1AC}"/>
+              </a:ext>
+            </a:extLst>
+          </p:cNvPr>
+          <p:cNvPicPr>
+            <a:picLocks noChangeAspect="1"/>
+          </p:cNvPicPr>
+          <p:nvPr/>
+        </p:nvPicPr>
+        <p:blipFill>
+          <a:blip r:embed="rId3" cstate="print">
+            <a:extLst>
+              <a:ext uri="{28A0092B-C50C-407E-A947-70E740481C1C}">
+                <a14:useLocalDpi xmlns:a14="http://schemas.microsoft.com/office/drawing/2010/main" val="0"/>
+              </a:ext>
+            </a:extLst>
+          </a:blip>
+          <a:stretch>
+            <a:fillRect/>
+          </a:stretch>
+        </p:blipFill>
+        <p:spPr>
+          <a:xfrm>
+            <a:off x="0" y="4169659"/>
+            <a:ext cx="3934976" cy="2688341"/>
+          </a:xfrm>
+          <a:prstGeom prst="rect">
+            <a:avLst/>
+          </a:prstGeom>
+        </p:spPr>
+      </p:pic>
+      <p:pic>
+        <p:nvPicPr>
+          <p:cNvPr id="5" name="圖片 4" descr="一張含有 螢幕擷取畫面 的圖片&#10;&#10;自動產生的描述">
+            <a:extLst>
+              <a:ext uri="{FF2B5EF4-FFF2-40B4-BE49-F238E27FC236}">
+                <a16:creationId xmlns:a16="http://schemas.microsoft.com/office/drawing/2014/main" id="{B9BC734C-7985-4E8C-8F3B-7342113B0113}"/>
+              </a:ext>
+            </a:extLst>
+          </p:cNvPr>
+          <p:cNvPicPr>
+            <a:picLocks noChangeAspect="1"/>
+          </p:cNvPicPr>
+          <p:nvPr/>
+        </p:nvPicPr>
+        <p:blipFill>
+          <a:blip r:embed="rId4">
+            <a:extLst>
+              <a:ext uri="{28A0092B-C50C-407E-A947-70E740481C1C}">
+                <a14:useLocalDpi xmlns:a14="http://schemas.microsoft.com/office/drawing/2010/main" val="0"/>
+              </a:ext>
+            </a:extLst>
+          </a:blip>
+          <a:stretch>
+            <a:fillRect/>
+          </a:stretch>
+        </p:blipFill>
+        <p:spPr>
+          <a:xfrm>
+            <a:off x="2022051" y="583630"/>
+            <a:ext cx="5099897" cy="5690739"/>
+          </a:xfrm>
+          <a:prstGeom prst="rect">
+            <a:avLst/>
+          </a:prstGeom>
+        </p:spPr>
+      </p:pic>
+    </p:spTree>
+    <p:extLst>
+      <p:ext uri="{BB962C8B-B14F-4D97-AF65-F5344CB8AC3E}">
+        <p14:creationId xmlns:p14="http://schemas.microsoft.com/office/powerpoint/2010/main" val="9219675"/>
       </p:ext>
     </p:extLst>
   </p:cSld>
@@ -7966,6 +8075,222 @@
     <p:extLst>
       <p:ext uri="{BB962C8B-B14F-4D97-AF65-F5344CB8AC3E}">
         <p14:creationId xmlns:p14="http://schemas.microsoft.com/office/powerpoint/2010/main" val="459639941"/>
+      </p:ext>
+    </p:extLst>
+  </p:cSld>
+  <p:clrMapOvr>
+    <a:masterClrMapping/>
+  </p:clrMapOvr>
+</p:sld>
+</file>
+
+<file path=ppt/slides/slide30.xml><?xml version="1.0" encoding="utf-8"?>
+<p:sld xmlns:a="http://schemas.openxmlformats.org/drawingml/2006/main" xmlns:r="http://schemas.openxmlformats.org/officeDocument/2006/relationships" xmlns:p="http://schemas.openxmlformats.org/presentationml/2006/main">
+  <p:cSld>
+    <p:spTree>
+      <p:nvGrpSpPr>
+        <p:cNvPr id="1" name=""/>
+        <p:cNvGrpSpPr/>
+        <p:nvPr/>
+      </p:nvGrpSpPr>
+      <p:grpSpPr>
+        <a:xfrm>
+          <a:off x="0" y="0"/>
+          <a:ext cx="0" cy="0"/>
+          <a:chOff x="0" y="0"/>
+          <a:chExt cx="0" cy="0"/>
+        </a:xfrm>
+      </p:grpSpPr>
+      <p:pic>
+        <p:nvPicPr>
+          <p:cNvPr id="3" name="圖片 2">
+            <a:extLst>
+              <a:ext uri="{FF2B5EF4-FFF2-40B4-BE49-F238E27FC236}">
+                <a16:creationId xmlns:a16="http://schemas.microsoft.com/office/drawing/2014/main" id="{1202EBDE-7F64-43BD-86B7-6C228CCEC2D0}"/>
+              </a:ext>
+            </a:extLst>
+          </p:cNvPr>
+          <p:cNvPicPr>
+            <a:picLocks noChangeAspect="1"/>
+          </p:cNvPicPr>
+          <p:nvPr/>
+        </p:nvPicPr>
+        <p:blipFill>
+          <a:blip r:embed="rId2" cstate="print">
+            <a:extLst>
+              <a:ext uri="{28A0092B-C50C-407E-A947-70E740481C1C}">
+                <a14:useLocalDpi xmlns:a14="http://schemas.microsoft.com/office/drawing/2010/main" val="0"/>
+              </a:ext>
+            </a:extLst>
+          </a:blip>
+          <a:stretch>
+            <a:fillRect/>
+          </a:stretch>
+        </p:blipFill>
+        <p:spPr>
+          <a:xfrm>
+            <a:off x="6598915" y="0"/>
+            <a:ext cx="2545085" cy="3294895"/>
+          </a:xfrm>
+          <a:prstGeom prst="rect">
+            <a:avLst/>
+          </a:prstGeom>
+        </p:spPr>
+      </p:pic>
+      <p:pic>
+        <p:nvPicPr>
+          <p:cNvPr id="4" name="圖片 3">
+            <a:extLst>
+              <a:ext uri="{FF2B5EF4-FFF2-40B4-BE49-F238E27FC236}">
+                <a16:creationId xmlns:a16="http://schemas.microsoft.com/office/drawing/2014/main" id="{AEFF5069-0FA7-44E7-AEEE-225463C6B1AC}"/>
+              </a:ext>
+            </a:extLst>
+          </p:cNvPr>
+          <p:cNvPicPr>
+            <a:picLocks noChangeAspect="1"/>
+          </p:cNvPicPr>
+          <p:nvPr/>
+        </p:nvPicPr>
+        <p:blipFill>
+          <a:blip r:embed="rId3" cstate="print">
+            <a:extLst>
+              <a:ext uri="{28A0092B-C50C-407E-A947-70E740481C1C}">
+                <a14:useLocalDpi xmlns:a14="http://schemas.microsoft.com/office/drawing/2010/main" val="0"/>
+              </a:ext>
+            </a:extLst>
+          </a:blip>
+          <a:stretch>
+            <a:fillRect/>
+          </a:stretch>
+        </p:blipFill>
+        <p:spPr>
+          <a:xfrm>
+            <a:off x="0" y="4169659"/>
+            <a:ext cx="3934976" cy="2688341"/>
+          </a:xfrm>
+          <a:prstGeom prst="rect">
+            <a:avLst/>
+          </a:prstGeom>
+        </p:spPr>
+      </p:pic>
+      <p:sp>
+        <p:nvSpPr>
+          <p:cNvPr id="5" name="文字方塊 4">
+            <a:extLst>
+              <a:ext uri="{FF2B5EF4-FFF2-40B4-BE49-F238E27FC236}">
+                <a16:creationId xmlns:a16="http://schemas.microsoft.com/office/drawing/2014/main" id="{91A50393-F597-4A23-9EA5-079944A6AFA0}"/>
+              </a:ext>
+            </a:extLst>
+          </p:cNvPr>
+          <p:cNvSpPr txBox="1"/>
+          <p:nvPr/>
+        </p:nvSpPr>
+        <p:spPr>
+          <a:xfrm>
+            <a:off x="1161603" y="1262963"/>
+            <a:ext cx="5830892" cy="1493101"/>
+          </a:xfrm>
+          <a:prstGeom prst="rect">
+            <a:avLst/>
+          </a:prstGeom>
+          <a:noFill/>
+        </p:spPr>
+        <p:txBody>
+          <a:bodyPr wrap="none" rtlCol="0">
+            <a:spAutoFit/>
+          </a:bodyPr>
+          <a:lstStyle/>
+          <a:p>
+            <a:pPr>
+              <a:lnSpc>
+                <a:spcPct val="150000"/>
+              </a:lnSpc>
+            </a:pPr>
+            <a:r>
+              <a:rPr lang="en-US" altLang="zh-TW" sz="3200" dirty="0">
+                <a:latin typeface="Arial Black" panose="020B0A04020102020204" pitchFamily="34" charset="0"/>
+                <a:ea typeface="微軟正黑體" panose="020B0604030504040204" pitchFamily="34" charset="-120"/>
+              </a:rPr>
+              <a:t>For most functions, </a:t>
+            </a:r>
+          </a:p>
+          <a:p>
+            <a:pPr>
+              <a:lnSpc>
+                <a:spcPct val="150000"/>
+              </a:lnSpc>
+            </a:pPr>
+            <a:r>
+              <a:rPr lang="en-US" altLang="zh-TW" sz="3200" dirty="0">
+                <a:latin typeface="Arial Black" panose="020B0A04020102020204" pitchFamily="34" charset="0"/>
+                <a:ea typeface="微軟正黑體" panose="020B0604030504040204" pitchFamily="34" charset="-120"/>
+              </a:rPr>
+              <a:t>you don’t have to build it.</a:t>
+            </a:r>
+          </a:p>
+        </p:txBody>
+      </p:sp>
+      <p:sp>
+        <p:nvSpPr>
+          <p:cNvPr id="6" name="文字方塊 5">
+            <a:extLst>
+              <a:ext uri="{FF2B5EF4-FFF2-40B4-BE49-F238E27FC236}">
+                <a16:creationId xmlns:a16="http://schemas.microsoft.com/office/drawing/2014/main" id="{E02F6E03-34CB-40F3-8AE9-D60F8B92935F}"/>
+              </a:ext>
+            </a:extLst>
+          </p:cNvPr>
+          <p:cNvSpPr txBox="1"/>
+          <p:nvPr/>
+        </p:nvSpPr>
+        <p:spPr>
+          <a:xfrm>
+            <a:off x="2597202" y="3429000"/>
+            <a:ext cx="5493170" cy="1493101"/>
+          </a:xfrm>
+          <a:prstGeom prst="rect">
+            <a:avLst/>
+          </a:prstGeom>
+          <a:noFill/>
+        </p:spPr>
+        <p:txBody>
+          <a:bodyPr wrap="none" rtlCol="0">
+            <a:spAutoFit/>
+          </a:bodyPr>
+          <a:lstStyle/>
+          <a:p>
+            <a:pPr>
+              <a:lnSpc>
+                <a:spcPct val="150000"/>
+              </a:lnSpc>
+            </a:pPr>
+            <a:r>
+              <a:rPr lang="en-US" altLang="zh-TW" sz="3200" dirty="0">
+                <a:latin typeface="Arial Black" panose="020B0A04020102020204" pitchFamily="34" charset="0"/>
+                <a:ea typeface="微軟正黑體" panose="020B0604030504040204" pitchFamily="34" charset="-120"/>
+              </a:rPr>
+              <a:t>You only need to find it </a:t>
+            </a:r>
+          </a:p>
+          <a:p>
+            <a:pPr>
+              <a:lnSpc>
+                <a:spcPct val="150000"/>
+              </a:lnSpc>
+            </a:pPr>
+            <a:r>
+              <a:rPr lang="en-US" altLang="zh-TW" sz="3200" dirty="0">
+                <a:latin typeface="Arial Black" panose="020B0A04020102020204" pitchFamily="34" charset="0"/>
+                <a:ea typeface="微軟正黑體" panose="020B0604030504040204" pitchFamily="34" charset="-120"/>
+              </a:rPr>
+              <a:t>and learn how to use it.</a:t>
+            </a:r>
+          </a:p>
+        </p:txBody>
+      </p:sp>
+    </p:spTree>
+    <p:extLst>
+      <p:ext uri="{BB962C8B-B14F-4D97-AF65-F5344CB8AC3E}">
+        <p14:creationId xmlns:p14="http://schemas.microsoft.com/office/powerpoint/2010/main" val="3958962463"/>
       </p:ext>
     </p:extLst>
   </p:cSld>

</xml_diff>